<commit_message>
Thumbail mit ASHX Handler
</commit_message>
<xml_diff>
--- a/13SecureWebForms.pptx
+++ b/13SecureWebForms.pptx
@@ -5,7 +5,7 @@
     <p:sldMasterId id="2147483684" r:id="rId1"/>
   </p:sldMasterIdLst>
   <p:notesMasterIdLst>
-    <p:notesMasterId r:id="rId20"/>
+    <p:notesMasterId r:id="rId19"/>
   </p:notesMasterIdLst>
   <p:sldIdLst>
     <p:sldId id="256" r:id="rId2"/>
@@ -20,12 +20,11 @@
     <p:sldId id="319" r:id="rId11"/>
     <p:sldId id="313" r:id="rId12"/>
     <p:sldId id="309" r:id="rId13"/>
-    <p:sldId id="314" r:id="rId14"/>
-    <p:sldId id="310" r:id="rId15"/>
-    <p:sldId id="312" r:id="rId16"/>
-    <p:sldId id="308" r:id="rId17"/>
-    <p:sldId id="302" r:id="rId18"/>
-    <p:sldId id="315" r:id="rId19"/>
+    <p:sldId id="310" r:id="rId14"/>
+    <p:sldId id="312" r:id="rId15"/>
+    <p:sldId id="308" r:id="rId16"/>
+    <p:sldId id="302" r:id="rId17"/>
+    <p:sldId id="315" r:id="rId18"/>
   </p:sldIdLst>
   <p:sldSz cx="12192000" cy="6858000"/>
   <p:notesSz cx="6858000" cy="9144000"/>
@@ -1148,654 +1147,6 @@
       </p:grpSpPr>
       <p:sp>
         <p:nvSpPr>
-          <p:cNvPr id="48130" name="Rectangle 2"/>
-          <p:cNvSpPr>
-            <a:spLocks noGrp="1" noRot="1" noChangeAspect="1" noChangeArrowheads="1" noTextEdit="1"/>
-          </p:cNvSpPr>
-          <p:nvPr>
-            <p:ph type="sldImg"/>
-          </p:nvPr>
-        </p:nvSpPr>
-        <p:spPr>
-          <a:ln/>
-        </p:spPr>
-      </p:sp>
-      <p:sp>
-        <p:nvSpPr>
-          <p:cNvPr id="48131" name="Rectangle 3"/>
-          <p:cNvSpPr>
-            <a:spLocks noGrp="1" noChangeArrowheads="1"/>
-          </p:cNvSpPr>
-          <p:nvPr>
-            <p:ph type="body" idx="1"/>
-          </p:nvPr>
-        </p:nvSpPr>
-        <p:spPr>
-          <a:xfrm>
-            <a:off x="304800" y="2155825"/>
-            <a:ext cx="6029325" cy="6843713"/>
-          </a:xfrm>
-          <a:noFill/>
-          <a:ln/>
-          <a:extLst>
-            <a:ext uri="{909E8E84-426E-40DD-AFC4-6F175D3DCCD1}">
-              <a14:hiddenFill xmlns:a14="http://schemas.microsoft.com/office/drawing/2010/main">
-                <a:solidFill>
-                  <a:srgbClr val="FFFFFF"/>
-                </a:solidFill>
-              </a14:hiddenFill>
-            </a:ext>
-            <a:ext uri="{91240B29-F687-4F45-9708-019B960494DF}">
-              <a14:hiddenLine xmlns:a14="http://schemas.microsoft.com/office/drawing/2010/main" w="9525">
-                <a:solidFill>
-                  <a:srgbClr val="000000"/>
-                </a:solidFill>
-                <a:miter lim="800000"/>
-                <a:headEnd/>
-                <a:tailEnd/>
-              </a14:hiddenLine>
-            </a:ext>
-          </a:extLst>
-        </p:spPr>
-        <p:txBody>
-          <a:bodyPr/>
-          <a:lstStyle/>
-          <a:p>
-            <a:r>
-              <a:rPr lang="en-US" altLang="de-DE">
-                <a:latin typeface="Arial" panose="020B0604020202020204" pitchFamily="34" charset="0"/>
-              </a:rPr>
-              <a:t>Briefly describe about using protected configuration.</a:t>
-            </a:r>
-          </a:p>
-          <a:p>
-            <a:r>
-              <a:rPr lang="en-US" altLang="de-DE">
-                <a:latin typeface="Arial" panose="020B0604020202020204" pitchFamily="34" charset="0"/>
-              </a:rPr>
-              <a:t>Refer to the Course Handbook and provide examples to show how the connection string values are stored in a configuration file.</a:t>
-            </a:r>
-            <a:br>
-              <a:rPr lang="en-US" altLang="de-DE">
-                <a:latin typeface="Arial" panose="020B0604020202020204" pitchFamily="34" charset="0"/>
-              </a:rPr>
-            </a:br>
-            <a:endParaRPr lang="en-US" altLang="de-DE">
-              <a:latin typeface="Arial" panose="020B0604020202020204" pitchFamily="34" charset="0"/>
-            </a:endParaRPr>
-          </a:p>
-          <a:p>
-            <a:r>
-              <a:rPr lang="en-US" altLang="de-DE" b="1">
-                <a:latin typeface="Arial" panose="020B0604020202020204" pitchFamily="34" charset="0"/>
-              </a:rPr>
-              <a:t>Question:</a:t>
-            </a:r>
-            <a:r>
-              <a:rPr lang="en-US" altLang="de-DE">
-                <a:latin typeface="Arial" panose="020B0604020202020204" pitchFamily="34" charset="0"/>
-              </a:rPr>
-              <a:t> What information can you encrypt in a Web application configuration file?</a:t>
-            </a:r>
-            <a:endParaRPr lang="en-US" altLang="de-DE" b="1">
-              <a:latin typeface="Arial" panose="020B0604020202020204" pitchFamily="34" charset="0"/>
-            </a:endParaRPr>
-          </a:p>
-          <a:p>
-            <a:r>
-              <a:rPr lang="en-US" altLang="de-DE" b="1">
-                <a:latin typeface="Arial" panose="020B0604020202020204" pitchFamily="34" charset="0"/>
-              </a:rPr>
-              <a:t>Answer:</a:t>
-            </a:r>
-            <a:r>
-              <a:rPr lang="en-US" altLang="de-DE">
-                <a:latin typeface="Arial" panose="020B0604020202020204" pitchFamily="34" charset="0"/>
-              </a:rPr>
-              <a:t> You can encrypt information such as user names and passwords, database connection strings, and encryption keys in a Web configuration file. </a:t>
-            </a:r>
-          </a:p>
-          <a:p>
-            <a:pPr>
-              <a:buFontTx/>
-              <a:buChar char="•"/>
-            </a:pPr>
-            <a:endParaRPr lang="en-US" altLang="de-DE">
-              <a:latin typeface="Arial" panose="020B0604020202020204" pitchFamily="34" charset="0"/>
-            </a:endParaRPr>
-          </a:p>
-          <a:p>
-            <a:pPr>
-              <a:buFontTx/>
-              <a:buChar char="•"/>
-            </a:pPr>
-            <a:endParaRPr lang="en-US" altLang="de-DE">
-              <a:latin typeface="Arial" panose="020B0604020202020204" pitchFamily="34" charset="0"/>
-            </a:endParaRPr>
-          </a:p>
-        </p:txBody>
-      </p:sp>
-      <p:sp>
-        <p:nvSpPr>
-          <p:cNvPr id="48132" name="Rectangle 2"/>
-          <p:cNvSpPr txBox="1">
-            <a:spLocks noGrp="1" noChangeArrowheads="1"/>
-          </p:cNvSpPr>
-          <p:nvPr/>
-        </p:nvSpPr>
-        <p:spPr bwMode="auto">
-          <a:xfrm>
-            <a:off x="0" y="238125"/>
-            <a:ext cx="3038475" cy="519113"/>
-          </a:xfrm>
-          <a:prstGeom prst="rect">
-            <a:avLst/>
-          </a:prstGeom>
-          <a:noFill/>
-          <a:ln>
-            <a:noFill/>
-          </a:ln>
-          <a:extLst>
-            <a:ext uri="{909E8E84-426E-40DD-AFC4-6F175D3DCCD1}">
-              <a14:hiddenFill xmlns:a14="http://schemas.microsoft.com/office/drawing/2010/main">
-                <a:solidFill>
-                  <a:srgbClr val="FFFFFF"/>
-                </a:solidFill>
-              </a14:hiddenFill>
-            </a:ext>
-            <a:ext uri="{91240B29-F687-4F45-9708-019B960494DF}">
-              <a14:hiddenLine xmlns:a14="http://schemas.microsoft.com/office/drawing/2010/main" w="9525">
-                <a:solidFill>
-                  <a:srgbClr val="000000"/>
-                </a:solidFill>
-                <a:miter lim="800000"/>
-                <a:headEnd/>
-                <a:tailEnd/>
-              </a14:hiddenLine>
-            </a:ext>
-          </a:extLst>
-        </p:spPr>
-        <p:txBody>
-          <a:bodyPr tIns="0" bIns="0"/>
-          <a:lstStyle>
-            <a:lvl1pPr algn="ctr" eaLnBrk="0" hangingPunct="0">
-              <a:defRPr>
-                <a:solidFill>
-                  <a:schemeClr val="tx1"/>
-                </a:solidFill>
-                <a:latin typeface="Verdana" panose="020B0604030504040204" pitchFamily="34" charset="0"/>
-                <a:cs typeface="Arial" panose="020B0604020202020204" pitchFamily="34" charset="0"/>
-              </a:defRPr>
-            </a:lvl1pPr>
-            <a:lvl2pPr marL="742950" indent="-285750" algn="ctr" eaLnBrk="0" hangingPunct="0">
-              <a:defRPr>
-                <a:solidFill>
-                  <a:schemeClr val="tx1"/>
-                </a:solidFill>
-                <a:latin typeface="Verdana" panose="020B0604030504040204" pitchFamily="34" charset="0"/>
-                <a:cs typeface="Arial" panose="020B0604020202020204" pitchFamily="34" charset="0"/>
-              </a:defRPr>
-            </a:lvl2pPr>
-            <a:lvl3pPr marL="1143000" indent="-228600" algn="ctr" eaLnBrk="0" hangingPunct="0">
-              <a:defRPr>
-                <a:solidFill>
-                  <a:schemeClr val="tx1"/>
-                </a:solidFill>
-                <a:latin typeface="Verdana" panose="020B0604030504040204" pitchFamily="34" charset="0"/>
-                <a:cs typeface="Arial" panose="020B0604020202020204" pitchFamily="34" charset="0"/>
-              </a:defRPr>
-            </a:lvl3pPr>
-            <a:lvl4pPr marL="1600200" indent="-228600" algn="ctr" eaLnBrk="0" hangingPunct="0">
-              <a:defRPr>
-                <a:solidFill>
-                  <a:schemeClr val="tx1"/>
-                </a:solidFill>
-                <a:latin typeface="Verdana" panose="020B0604030504040204" pitchFamily="34" charset="0"/>
-                <a:cs typeface="Arial" panose="020B0604020202020204" pitchFamily="34" charset="0"/>
-              </a:defRPr>
-            </a:lvl4pPr>
-            <a:lvl5pPr marL="2057400" indent="-228600" algn="ctr" eaLnBrk="0" hangingPunct="0">
-              <a:defRPr>
-                <a:solidFill>
-                  <a:schemeClr val="tx1"/>
-                </a:solidFill>
-                <a:latin typeface="Verdana" panose="020B0604030504040204" pitchFamily="34" charset="0"/>
-                <a:cs typeface="Arial" panose="020B0604020202020204" pitchFamily="34" charset="0"/>
-              </a:defRPr>
-            </a:lvl5pPr>
-            <a:lvl6pPr marL="2514600" indent="-228600" algn="ctr" eaLnBrk="0" fontAlgn="base" hangingPunct="0">
-              <a:spcBef>
-                <a:spcPct val="0"/>
-              </a:spcBef>
-              <a:spcAft>
-                <a:spcPct val="0"/>
-              </a:spcAft>
-              <a:defRPr>
-                <a:solidFill>
-                  <a:schemeClr val="tx1"/>
-                </a:solidFill>
-                <a:latin typeface="Verdana" panose="020B0604030504040204" pitchFamily="34" charset="0"/>
-                <a:cs typeface="Arial" panose="020B0604020202020204" pitchFamily="34" charset="0"/>
-              </a:defRPr>
-            </a:lvl6pPr>
-            <a:lvl7pPr marL="2971800" indent="-228600" algn="ctr" eaLnBrk="0" fontAlgn="base" hangingPunct="0">
-              <a:spcBef>
-                <a:spcPct val="0"/>
-              </a:spcBef>
-              <a:spcAft>
-                <a:spcPct val="0"/>
-              </a:spcAft>
-              <a:defRPr>
-                <a:solidFill>
-                  <a:schemeClr val="tx1"/>
-                </a:solidFill>
-                <a:latin typeface="Verdana" panose="020B0604030504040204" pitchFamily="34" charset="0"/>
-                <a:cs typeface="Arial" panose="020B0604020202020204" pitchFamily="34" charset="0"/>
-              </a:defRPr>
-            </a:lvl7pPr>
-            <a:lvl8pPr marL="3429000" indent="-228600" algn="ctr" eaLnBrk="0" fontAlgn="base" hangingPunct="0">
-              <a:spcBef>
-                <a:spcPct val="0"/>
-              </a:spcBef>
-              <a:spcAft>
-                <a:spcPct val="0"/>
-              </a:spcAft>
-              <a:defRPr>
-                <a:solidFill>
-                  <a:schemeClr val="tx1"/>
-                </a:solidFill>
-                <a:latin typeface="Verdana" panose="020B0604030504040204" pitchFamily="34" charset="0"/>
-                <a:cs typeface="Arial" panose="020B0604020202020204" pitchFamily="34" charset="0"/>
-              </a:defRPr>
-            </a:lvl8pPr>
-            <a:lvl9pPr marL="3886200" indent="-228600" algn="ctr" eaLnBrk="0" fontAlgn="base" hangingPunct="0">
-              <a:spcBef>
-                <a:spcPct val="0"/>
-              </a:spcBef>
-              <a:spcAft>
-                <a:spcPct val="0"/>
-              </a:spcAft>
-              <a:defRPr>
-                <a:solidFill>
-                  <a:schemeClr val="tx1"/>
-                </a:solidFill>
-                <a:latin typeface="Verdana" panose="020B0604030504040204" pitchFamily="34" charset="0"/>
-                <a:cs typeface="Arial" panose="020B0604020202020204" pitchFamily="34" charset="0"/>
-              </a:defRPr>
-            </a:lvl9pPr>
-          </a:lstStyle>
-          <a:p>
-            <a:pPr algn="l" eaLnBrk="1" hangingPunct="1"/>
-            <a:r>
-              <a:rPr lang="en-US" altLang="de-DE" sz="1200" b="1">
-                <a:solidFill>
-                  <a:srgbClr val="336699"/>
-                </a:solidFill>
-                <a:latin typeface="Arial" panose="020B0604020202020204" pitchFamily="34" charset="0"/>
-              </a:rPr>
-              <a:t>Module 15: Securing a Microsoft</a:t>
-            </a:r>
-            <a:r>
-              <a:rPr lang="en-US" altLang="de-DE" sz="1200" b="1">
-                <a:solidFill>
-                  <a:srgbClr val="336699"/>
-                </a:solidFill>
-                <a:latin typeface="Times New Roman" panose="02020603050405020304" pitchFamily="18" charset="0"/>
-                <a:cs typeface="Times New Roman" panose="02020603050405020304" pitchFamily="18" charset="0"/>
-              </a:rPr>
-              <a:t>®</a:t>
-            </a:r>
-            <a:r>
-              <a:rPr lang="en-US" altLang="de-DE" sz="1200" b="1">
-                <a:solidFill>
-                  <a:srgbClr val="336699"/>
-                </a:solidFill>
-                <a:latin typeface="Arial" panose="020B0604020202020204" pitchFamily="34" charset="0"/>
-              </a:rPr>
-              <a:t> ASP.NET Web Application</a:t>
-            </a:r>
-          </a:p>
-        </p:txBody>
-      </p:sp>
-      <p:sp>
-        <p:nvSpPr>
-          <p:cNvPr id="48133" name="Rectangle 3"/>
-          <p:cNvSpPr txBox="1">
-            <a:spLocks noGrp="1" noChangeArrowheads="1"/>
-          </p:cNvSpPr>
-          <p:nvPr/>
-        </p:nvSpPr>
-        <p:spPr bwMode="auto">
-          <a:xfrm>
-            <a:off x="0" y="0"/>
-            <a:ext cx="3038475" cy="331788"/>
-          </a:xfrm>
-          <a:prstGeom prst="rect">
-            <a:avLst/>
-          </a:prstGeom>
-          <a:noFill/>
-          <a:ln>
-            <a:noFill/>
-          </a:ln>
-          <a:extLst>
-            <a:ext uri="{909E8E84-426E-40DD-AFC4-6F175D3DCCD1}">
-              <a14:hiddenFill xmlns:a14="http://schemas.microsoft.com/office/drawing/2010/main">
-                <a:solidFill>
-                  <a:srgbClr val="FFFFFF"/>
-                </a:solidFill>
-              </a14:hiddenFill>
-            </a:ext>
-            <a:ext uri="{91240B29-F687-4F45-9708-019B960494DF}">
-              <a14:hiddenLine xmlns:a14="http://schemas.microsoft.com/office/drawing/2010/main" w="9525">
-                <a:solidFill>
-                  <a:srgbClr val="000000"/>
-                </a:solidFill>
-                <a:miter lim="800000"/>
-                <a:headEnd/>
-                <a:tailEnd/>
-              </a14:hiddenLine>
-            </a:ext>
-          </a:extLst>
-        </p:spPr>
-        <p:txBody>
-          <a:bodyPr/>
-          <a:lstStyle>
-            <a:lvl1pPr algn="ctr" eaLnBrk="0" hangingPunct="0">
-              <a:defRPr>
-                <a:solidFill>
-                  <a:schemeClr val="tx1"/>
-                </a:solidFill>
-                <a:latin typeface="Verdana" panose="020B0604030504040204" pitchFamily="34" charset="0"/>
-                <a:cs typeface="Arial" panose="020B0604020202020204" pitchFamily="34" charset="0"/>
-              </a:defRPr>
-            </a:lvl1pPr>
-            <a:lvl2pPr marL="742950" indent="-285750" algn="ctr" eaLnBrk="0" hangingPunct="0">
-              <a:defRPr>
-                <a:solidFill>
-                  <a:schemeClr val="tx1"/>
-                </a:solidFill>
-                <a:latin typeface="Verdana" panose="020B0604030504040204" pitchFamily="34" charset="0"/>
-                <a:cs typeface="Arial" panose="020B0604020202020204" pitchFamily="34" charset="0"/>
-              </a:defRPr>
-            </a:lvl2pPr>
-            <a:lvl3pPr marL="1143000" indent="-228600" algn="ctr" eaLnBrk="0" hangingPunct="0">
-              <a:defRPr>
-                <a:solidFill>
-                  <a:schemeClr val="tx1"/>
-                </a:solidFill>
-                <a:latin typeface="Verdana" panose="020B0604030504040204" pitchFamily="34" charset="0"/>
-                <a:cs typeface="Arial" panose="020B0604020202020204" pitchFamily="34" charset="0"/>
-              </a:defRPr>
-            </a:lvl3pPr>
-            <a:lvl4pPr marL="1600200" indent="-228600" algn="ctr" eaLnBrk="0" hangingPunct="0">
-              <a:defRPr>
-                <a:solidFill>
-                  <a:schemeClr val="tx1"/>
-                </a:solidFill>
-                <a:latin typeface="Verdana" panose="020B0604030504040204" pitchFamily="34" charset="0"/>
-                <a:cs typeface="Arial" panose="020B0604020202020204" pitchFamily="34" charset="0"/>
-              </a:defRPr>
-            </a:lvl4pPr>
-            <a:lvl5pPr marL="2057400" indent="-228600" algn="ctr" eaLnBrk="0" hangingPunct="0">
-              <a:defRPr>
-                <a:solidFill>
-                  <a:schemeClr val="tx1"/>
-                </a:solidFill>
-                <a:latin typeface="Verdana" panose="020B0604030504040204" pitchFamily="34" charset="0"/>
-                <a:cs typeface="Arial" panose="020B0604020202020204" pitchFamily="34" charset="0"/>
-              </a:defRPr>
-            </a:lvl5pPr>
-            <a:lvl6pPr marL="2514600" indent="-228600" algn="ctr" eaLnBrk="0" fontAlgn="base" hangingPunct="0">
-              <a:spcBef>
-                <a:spcPct val="0"/>
-              </a:spcBef>
-              <a:spcAft>
-                <a:spcPct val="0"/>
-              </a:spcAft>
-              <a:defRPr>
-                <a:solidFill>
-                  <a:schemeClr val="tx1"/>
-                </a:solidFill>
-                <a:latin typeface="Verdana" panose="020B0604030504040204" pitchFamily="34" charset="0"/>
-                <a:cs typeface="Arial" panose="020B0604020202020204" pitchFamily="34" charset="0"/>
-              </a:defRPr>
-            </a:lvl6pPr>
-            <a:lvl7pPr marL="2971800" indent="-228600" algn="ctr" eaLnBrk="0" fontAlgn="base" hangingPunct="0">
-              <a:spcBef>
-                <a:spcPct val="0"/>
-              </a:spcBef>
-              <a:spcAft>
-                <a:spcPct val="0"/>
-              </a:spcAft>
-              <a:defRPr>
-                <a:solidFill>
-                  <a:schemeClr val="tx1"/>
-                </a:solidFill>
-                <a:latin typeface="Verdana" panose="020B0604030504040204" pitchFamily="34" charset="0"/>
-                <a:cs typeface="Arial" panose="020B0604020202020204" pitchFamily="34" charset="0"/>
-              </a:defRPr>
-            </a:lvl7pPr>
-            <a:lvl8pPr marL="3429000" indent="-228600" algn="ctr" eaLnBrk="0" fontAlgn="base" hangingPunct="0">
-              <a:spcBef>
-                <a:spcPct val="0"/>
-              </a:spcBef>
-              <a:spcAft>
-                <a:spcPct val="0"/>
-              </a:spcAft>
-              <a:defRPr>
-                <a:solidFill>
-                  <a:schemeClr val="tx1"/>
-                </a:solidFill>
-                <a:latin typeface="Verdana" panose="020B0604030504040204" pitchFamily="34" charset="0"/>
-                <a:cs typeface="Arial" panose="020B0604020202020204" pitchFamily="34" charset="0"/>
-              </a:defRPr>
-            </a:lvl8pPr>
-            <a:lvl9pPr marL="3886200" indent="-228600" algn="ctr" eaLnBrk="0" fontAlgn="base" hangingPunct="0">
-              <a:spcBef>
-                <a:spcPct val="0"/>
-              </a:spcBef>
-              <a:spcAft>
-                <a:spcPct val="0"/>
-              </a:spcAft>
-              <a:defRPr>
-                <a:solidFill>
-                  <a:schemeClr val="tx1"/>
-                </a:solidFill>
-                <a:latin typeface="Verdana" panose="020B0604030504040204" pitchFamily="34" charset="0"/>
-                <a:cs typeface="Arial" panose="020B0604020202020204" pitchFamily="34" charset="0"/>
-              </a:defRPr>
-            </a:lvl9pPr>
-          </a:lstStyle>
-          <a:p>
-            <a:pPr algn="l" eaLnBrk="1" hangingPunct="1"/>
-            <a:r>
-              <a:rPr lang="en-US" altLang="de-DE" sz="1200" b="1">
-                <a:latin typeface="Arial" panose="020B0604020202020204" pitchFamily="34" charset="0"/>
-              </a:rPr>
-              <a:t>Course 10267A</a:t>
-            </a:r>
-          </a:p>
-        </p:txBody>
-      </p:sp>
-      <p:sp>
-        <p:nvSpPr>
-          <p:cNvPr id="6" name="Rectangle 7"/>
-          <p:cNvSpPr txBox="1">
-            <a:spLocks noGrp="1" noChangeArrowheads="1"/>
-          </p:cNvSpPr>
-          <p:nvPr/>
-        </p:nvSpPr>
-        <p:spPr bwMode="auto">
-          <a:xfrm>
-            <a:off x="3970338" y="8829675"/>
-            <a:ext cx="3038475" cy="465138"/>
-          </a:xfrm>
-          <a:prstGeom prst="rect">
-            <a:avLst/>
-          </a:prstGeom>
-          <a:noFill/>
-          <a:ln>
-            <a:miter lim="800000"/>
-            <a:headEnd/>
-            <a:tailEnd/>
-          </a:ln>
-        </p:spPr>
-        <p:txBody>
-          <a:bodyPr anchor="b"/>
-          <a:lstStyle>
-            <a:lvl1pPr algn="ctr" eaLnBrk="0" hangingPunct="0">
-              <a:defRPr>
-                <a:solidFill>
-                  <a:schemeClr val="tx1"/>
-                </a:solidFill>
-                <a:latin typeface="Verdana" panose="020B0604030504040204" pitchFamily="34" charset="0"/>
-                <a:cs typeface="Arial" panose="020B0604020202020204" pitchFamily="34" charset="0"/>
-              </a:defRPr>
-            </a:lvl1pPr>
-            <a:lvl2pPr marL="742950" indent="-285750" algn="ctr" eaLnBrk="0" hangingPunct="0">
-              <a:defRPr>
-                <a:solidFill>
-                  <a:schemeClr val="tx1"/>
-                </a:solidFill>
-                <a:latin typeface="Verdana" panose="020B0604030504040204" pitchFamily="34" charset="0"/>
-                <a:cs typeface="Arial" panose="020B0604020202020204" pitchFamily="34" charset="0"/>
-              </a:defRPr>
-            </a:lvl2pPr>
-            <a:lvl3pPr marL="1143000" indent="-228600" algn="ctr" eaLnBrk="0" hangingPunct="0">
-              <a:defRPr>
-                <a:solidFill>
-                  <a:schemeClr val="tx1"/>
-                </a:solidFill>
-                <a:latin typeface="Verdana" panose="020B0604030504040204" pitchFamily="34" charset="0"/>
-                <a:cs typeface="Arial" panose="020B0604020202020204" pitchFamily="34" charset="0"/>
-              </a:defRPr>
-            </a:lvl3pPr>
-            <a:lvl4pPr marL="1600200" indent="-228600" algn="ctr" eaLnBrk="0" hangingPunct="0">
-              <a:defRPr>
-                <a:solidFill>
-                  <a:schemeClr val="tx1"/>
-                </a:solidFill>
-                <a:latin typeface="Verdana" panose="020B0604030504040204" pitchFamily="34" charset="0"/>
-                <a:cs typeface="Arial" panose="020B0604020202020204" pitchFamily="34" charset="0"/>
-              </a:defRPr>
-            </a:lvl4pPr>
-            <a:lvl5pPr marL="2057400" indent="-228600" algn="ctr" eaLnBrk="0" hangingPunct="0">
-              <a:defRPr>
-                <a:solidFill>
-                  <a:schemeClr val="tx1"/>
-                </a:solidFill>
-                <a:latin typeface="Verdana" panose="020B0604030504040204" pitchFamily="34" charset="0"/>
-                <a:cs typeface="Arial" panose="020B0604020202020204" pitchFamily="34" charset="0"/>
-              </a:defRPr>
-            </a:lvl5pPr>
-            <a:lvl6pPr marL="2514600" indent="-228600" algn="ctr" eaLnBrk="0" fontAlgn="base" hangingPunct="0">
-              <a:spcBef>
-                <a:spcPct val="0"/>
-              </a:spcBef>
-              <a:spcAft>
-                <a:spcPct val="0"/>
-              </a:spcAft>
-              <a:defRPr>
-                <a:solidFill>
-                  <a:schemeClr val="tx1"/>
-                </a:solidFill>
-                <a:latin typeface="Verdana" panose="020B0604030504040204" pitchFamily="34" charset="0"/>
-                <a:cs typeface="Arial" panose="020B0604020202020204" pitchFamily="34" charset="0"/>
-              </a:defRPr>
-            </a:lvl6pPr>
-            <a:lvl7pPr marL="2971800" indent="-228600" algn="ctr" eaLnBrk="0" fontAlgn="base" hangingPunct="0">
-              <a:spcBef>
-                <a:spcPct val="0"/>
-              </a:spcBef>
-              <a:spcAft>
-                <a:spcPct val="0"/>
-              </a:spcAft>
-              <a:defRPr>
-                <a:solidFill>
-                  <a:schemeClr val="tx1"/>
-                </a:solidFill>
-                <a:latin typeface="Verdana" panose="020B0604030504040204" pitchFamily="34" charset="0"/>
-                <a:cs typeface="Arial" panose="020B0604020202020204" pitchFamily="34" charset="0"/>
-              </a:defRPr>
-            </a:lvl7pPr>
-            <a:lvl8pPr marL="3429000" indent="-228600" algn="ctr" eaLnBrk="0" fontAlgn="base" hangingPunct="0">
-              <a:spcBef>
-                <a:spcPct val="0"/>
-              </a:spcBef>
-              <a:spcAft>
-                <a:spcPct val="0"/>
-              </a:spcAft>
-              <a:defRPr>
-                <a:solidFill>
-                  <a:schemeClr val="tx1"/>
-                </a:solidFill>
-                <a:latin typeface="Verdana" panose="020B0604030504040204" pitchFamily="34" charset="0"/>
-                <a:cs typeface="Arial" panose="020B0604020202020204" pitchFamily="34" charset="0"/>
-              </a:defRPr>
-            </a:lvl8pPr>
-            <a:lvl9pPr marL="3886200" indent="-228600" algn="ctr" eaLnBrk="0" fontAlgn="base" hangingPunct="0">
-              <a:spcBef>
-                <a:spcPct val="0"/>
-              </a:spcBef>
-              <a:spcAft>
-                <a:spcPct val="0"/>
-              </a:spcAft>
-              <a:defRPr>
-                <a:solidFill>
-                  <a:schemeClr val="tx1"/>
-                </a:solidFill>
-                <a:latin typeface="Verdana" panose="020B0604030504040204" pitchFamily="34" charset="0"/>
-                <a:cs typeface="Arial" panose="020B0604020202020204" pitchFamily="34" charset="0"/>
-              </a:defRPr>
-            </a:lvl9pPr>
-          </a:lstStyle>
-          <a:p>
-            <a:pPr algn="r" eaLnBrk="1" hangingPunct="1"/>
-            <a:fld id="{048A7CFE-CA36-4A23-965C-C5075059D49A}" type="slidenum">
-              <a:rPr lang="en-US" altLang="de-DE" sz="1200">
-                <a:latin typeface="Arial" panose="020B0604020202020204" pitchFamily="34" charset="0"/>
-              </a:rPr>
-              <a:pPr algn="r" eaLnBrk="1" hangingPunct="1"/>
-              <a:t>16</a:t>
-            </a:fld>
-            <a:endParaRPr lang="en-US" altLang="de-DE" sz="1200">
-              <a:latin typeface="Arial" panose="020B0604020202020204" pitchFamily="34" charset="0"/>
-            </a:endParaRPr>
-          </a:p>
-        </p:txBody>
-      </p:sp>
-    </p:spTree>
-    <p:extLst>
-      <p:ext uri="{BB962C8B-B14F-4D97-AF65-F5344CB8AC3E}">
-        <p14:creationId xmlns:p14="http://schemas.microsoft.com/office/powerpoint/2010/main" val="281041195"/>
-      </p:ext>
-    </p:extLst>
-  </p:cSld>
-  <p:clrMapOvr>
-    <a:masterClrMapping/>
-  </p:clrMapOvr>
-</p:notes>
-</file>
-
-<file path=ppt/notesSlides/notesSlide11.xml><?xml version="1.0" encoding="utf-8"?>
-<p:notes xmlns:a="http://schemas.openxmlformats.org/drawingml/2006/main" xmlns:r="http://schemas.openxmlformats.org/officeDocument/2006/relationships" xmlns:p="http://schemas.openxmlformats.org/presentationml/2006/main">
-  <p:cSld>
-    <p:spTree>
-      <p:nvGrpSpPr>
-        <p:cNvPr id="1" name=""/>
-        <p:cNvGrpSpPr/>
-        <p:nvPr/>
-      </p:nvGrpSpPr>
-      <p:grpSpPr>
-        <a:xfrm>
-          <a:off x="0" y="0"/>
-          <a:ext cx="0" cy="0"/>
-          <a:chOff x="0" y="0"/>
-          <a:chExt cx="0" cy="0"/>
-        </a:xfrm>
-      </p:grpSpPr>
-      <p:sp>
-        <p:nvSpPr>
           <p:cNvPr id="65538" name="Rectangle 2"/>
           <p:cNvSpPr>
             <a:spLocks noGrp="1" noRot="1" noChangeAspect="1" noChangeArrowheads="1" noTextEdit="1"/>
@@ -2455,7 +1806,7 @@
                 <a:latin typeface="Arial" panose="020B0604020202020204" pitchFamily="34" charset="0"/>
               </a:rPr>
               <a:pPr algn="r" eaLnBrk="1" hangingPunct="1"/>
-              <a:t>17</a:t>
+              <a:t>16</a:t>
             </a:fld>
             <a:endParaRPr lang="en-US" altLang="de-DE" sz="1200">
               <a:latin typeface="Arial" panose="020B0604020202020204" pitchFamily="34" charset="0"/>
@@ -6365,7 +5716,7 @@
     </p:spTree>
     <p:extLst>
       <p:ext uri="{BB962C8B-B14F-4D97-AF65-F5344CB8AC3E}">
-        <p14:creationId xmlns:p14="http://schemas.microsoft.com/office/powerpoint/2010/main" val="2210223238"/>
+        <p14:creationId xmlns:p14="http://schemas.microsoft.com/office/powerpoint/2010/main" val="833431484"/>
       </p:ext>
     </p:extLst>
   </p:cSld>
@@ -6990,7 +6341,7 @@
     </p:spTree>
     <p:extLst>
       <p:ext uri="{BB962C8B-B14F-4D97-AF65-F5344CB8AC3E}">
-        <p14:creationId xmlns:p14="http://schemas.microsoft.com/office/powerpoint/2010/main" val="833431484"/>
+        <p14:creationId xmlns:p14="http://schemas.microsoft.com/office/powerpoint/2010/main" val="1992747048"/>
       </p:ext>
     </p:extLst>
   </p:cSld>
@@ -7019,7 +6370,7 @@
       </p:grpSpPr>
       <p:sp>
         <p:nvSpPr>
-          <p:cNvPr id="46082" name="Rectangle 2"/>
+          <p:cNvPr id="48130" name="Rectangle 2"/>
           <p:cNvSpPr>
             <a:spLocks noGrp="1" noRot="1" noChangeAspect="1" noChangeArrowheads="1" noTextEdit="1"/>
           </p:cNvSpPr>
@@ -7033,7 +6384,7 @@
       </p:sp>
       <p:sp>
         <p:nvSpPr>
-          <p:cNvPr id="46083" name="Rectangle 3"/>
+          <p:cNvPr id="48131" name="Rectangle 3"/>
           <p:cNvSpPr>
             <a:spLocks noGrp="1" noChangeArrowheads="1"/>
           </p:cNvSpPr>
@@ -7043,7 +6394,7 @@
         </p:nvSpPr>
         <p:spPr>
           <a:xfrm>
-            <a:off x="266700" y="2108200"/>
+            <a:off x="304800" y="2155825"/>
             <a:ext cx="6029325" cy="6843713"/>
           </a:xfrm>
           <a:noFill/>
@@ -7073,20 +6424,25 @@
           <a:lstStyle/>
           <a:p>
             <a:r>
-              <a:rPr lang="en-GB" altLang="de-DE">
-                <a:latin typeface="Arial" panose="020B0604020202020204" pitchFamily="34" charset="0"/>
-              </a:rPr>
-              <a:t>Explain that the animation shows how </a:t>
-            </a:r>
-            <a:r>
               <a:rPr lang="en-US" altLang="de-DE">
                 <a:latin typeface="Arial" panose="020B0604020202020204" pitchFamily="34" charset="0"/>
               </a:rPr>
-              <a:t>Forms-based authentication works with a nonauthenticated client, and with an authenticated client.</a:t>
-            </a:r>
-          </a:p>
-          <a:p>
-            <a:endParaRPr lang="en-GB" altLang="de-DE">
+              <a:t>Briefly describe about using protected configuration.</a:t>
+            </a:r>
+          </a:p>
+          <a:p>
+            <a:r>
+              <a:rPr lang="en-US" altLang="de-DE">
+                <a:latin typeface="Arial" panose="020B0604020202020204" pitchFamily="34" charset="0"/>
+              </a:rPr>
+              <a:t>Refer to the Course Handbook and provide examples to show how the connection string values are stored in a configuration file.</a:t>
+            </a:r>
+            <a:br>
+              <a:rPr lang="en-US" altLang="de-DE">
+                <a:latin typeface="Arial" panose="020B0604020202020204" pitchFamily="34" charset="0"/>
+              </a:rPr>
+            </a:br>
+            <a:endParaRPr lang="en-US" altLang="de-DE">
               <a:latin typeface="Arial" panose="020B0604020202020204" pitchFamily="34" charset="0"/>
             </a:endParaRPr>
           </a:p>
@@ -7101,7 +6457,7 @@
               <a:rPr lang="en-US" altLang="de-DE">
                 <a:latin typeface="Arial" panose="020B0604020202020204" pitchFamily="34" charset="0"/>
               </a:rPr>
-              <a:t> When using Forms-based authentication, how are authentication credentials saved after a successful logon?</a:t>
+              <a:t> What information can you encrypt in a Web application configuration file?</a:t>
             </a:r>
             <a:endParaRPr lang="en-US" altLang="de-DE" b="1">
               <a:latin typeface="Arial" panose="020B0604020202020204" pitchFamily="34" charset="0"/>
@@ -7118,14 +6474,32 @@
               <a:rPr lang="en-US" altLang="de-DE">
                 <a:latin typeface="Arial" panose="020B0604020202020204" pitchFamily="34" charset="0"/>
               </a:rPr>
-              <a:t> Authentication credentials are saved to the client by using a cookie, if not cookies have not been explicitly disabled on the client. </a:t>
-            </a:r>
+              <a:t> You can encrypt information such as user names and passwords, database connection strings, and encryption keys in a Web configuration file. </a:t>
+            </a:r>
+          </a:p>
+          <a:p>
+            <a:pPr>
+              <a:buFontTx/>
+              <a:buChar char="•"/>
+            </a:pPr>
+            <a:endParaRPr lang="en-US" altLang="de-DE">
+              <a:latin typeface="Arial" panose="020B0604020202020204" pitchFamily="34" charset="0"/>
+            </a:endParaRPr>
+          </a:p>
+          <a:p>
+            <a:pPr>
+              <a:buFontTx/>
+              <a:buChar char="•"/>
+            </a:pPr>
+            <a:endParaRPr lang="en-US" altLang="de-DE">
+              <a:latin typeface="Arial" panose="020B0604020202020204" pitchFamily="34" charset="0"/>
+            </a:endParaRPr>
           </a:p>
         </p:txBody>
       </p:sp>
       <p:sp>
         <p:nvSpPr>
-          <p:cNvPr id="46084" name="Rectangle 2"/>
+          <p:cNvPr id="48132" name="Rectangle 2"/>
           <p:cNvSpPr txBox="1">
             <a:spLocks noGrp="1" noChangeArrowheads="1"/>
           </p:cNvSpPr>
@@ -7307,7 +6681,7 @@
       </p:sp>
       <p:sp>
         <p:nvSpPr>
-          <p:cNvPr id="46085" name="Rectangle 3"/>
+          <p:cNvPr id="48133" name="Rectangle 3"/>
           <p:cNvSpPr txBox="1">
             <a:spLocks noGrp="1" noChangeArrowheads="1"/>
           </p:cNvSpPr>
@@ -7599,7 +6973,7 @@
           </a:lstStyle>
           <a:p>
             <a:pPr algn="r" eaLnBrk="1" hangingPunct="1"/>
-            <a:fld id="{F2484891-251F-4D78-A93D-949CCAD0817A}" type="slidenum">
+            <a:fld id="{048A7CFE-CA36-4A23-965C-C5075059D49A}" type="slidenum">
               <a:rPr lang="en-US" altLang="de-DE" sz="1200">
                 <a:latin typeface="Arial" panose="020B0604020202020204" pitchFamily="34" charset="0"/>
               </a:rPr>
@@ -7615,7 +6989,7 @@
     </p:spTree>
     <p:extLst>
       <p:ext uri="{BB962C8B-B14F-4D97-AF65-F5344CB8AC3E}">
-        <p14:creationId xmlns:p14="http://schemas.microsoft.com/office/powerpoint/2010/main" val="1992747048"/>
+        <p14:creationId xmlns:p14="http://schemas.microsoft.com/office/powerpoint/2010/main" val="281041195"/>
       </p:ext>
     </p:extLst>
   </p:cSld>
@@ -12087,11 +11461,13 @@
                   </a:schemeClr>
                 </a:solidFill>
                 <a:latin typeface="Century Gothic" panose="020B0502020202020204" pitchFamily="34" charset="0"/>
-              </a:rPr>
-              <a:t>Windows</a:t>
-            </a:r>
-            <a:r>
-              <a:rPr lang="en-US" altLang="de-DE" sz="5400" dirty="0">
+                <a:ea typeface="+mn-ea"/>
+                <a:cs typeface="+mn-cs"/>
+              </a:rPr>
+              <a:t>Form </a:t>
+            </a:r>
+            <a:r>
+              <a:rPr lang="en-US" altLang="de-DE" sz="5400" dirty="0" err="1">
                 <a:solidFill>
                   <a:schemeClr val="bg1">
                     <a:lumMod val="65000"/>
@@ -12101,7 +11477,368 @@
                 <a:ea typeface="+mn-ea"/>
                 <a:cs typeface="+mn-cs"/>
               </a:rPr>
+              <a:t>Authentifikation</a:t>
+            </a:r>
+            <a:endParaRPr lang="en-US" altLang="de-DE" sz="5400" dirty="0">
+              <a:solidFill>
+                <a:schemeClr val="bg1">
+                  <a:lumMod val="65000"/>
+                </a:schemeClr>
+              </a:solidFill>
+              <a:latin typeface="Century Gothic" panose="020B0502020202020204" pitchFamily="34" charset="0"/>
+              <a:ea typeface="+mn-ea"/>
+              <a:cs typeface="+mn-cs"/>
+            </a:endParaRPr>
+          </a:p>
+        </p:txBody>
+      </p:sp>
+      <p:sp>
+        <p:nvSpPr>
+          <p:cNvPr id="3" name="Rectangle 1"/>
+          <p:cNvSpPr>
+            <a:spLocks noChangeArrowheads="1"/>
+          </p:cNvSpPr>
+          <p:nvPr/>
+        </p:nvSpPr>
+        <p:spPr bwMode="auto">
+          <a:xfrm>
+            <a:off x="846992" y="2576463"/>
+            <a:ext cx="9325708" cy="1231106"/>
+          </a:xfrm>
+          <a:prstGeom prst="rect">
+            <a:avLst/>
+          </a:prstGeom>
+          <a:noFill/>
+          <a:ln>
+            <a:noFill/>
+          </a:ln>
+          <a:effectLst/>
+          <a:extLst>
+            <a:ext uri="{909E8E84-426E-40DD-AFC4-6F175D3DCCD1}">
+              <a14:hiddenFill xmlns:a14="http://schemas.microsoft.com/office/drawing/2010/main">
+                <a:solidFill>
+                  <a:schemeClr val="accent1"/>
+                </a:solidFill>
+              </a14:hiddenFill>
+            </a:ext>
+            <a:ext uri="{91240B29-F687-4F45-9708-019B960494DF}">
+              <a14:hiddenLine xmlns:a14="http://schemas.microsoft.com/office/drawing/2010/main" w="9525">
+                <a:solidFill>
+                  <a:schemeClr val="tx1"/>
+                </a:solidFill>
+                <a:miter lim="800000"/>
+                <a:headEnd/>
+                <a:tailEnd/>
+              </a14:hiddenLine>
+            </a:ext>
+            <a:ext uri="{AF507438-7753-43E0-B8FC-AC1667EBCBE1}">
+              <a14:hiddenEffects xmlns:a14="http://schemas.microsoft.com/office/drawing/2010/main">
+                <a:effectLst>
+                  <a:outerShdw dist="35921" dir="2700000" algn="ctr" rotWithShape="0">
+                    <a:schemeClr val="bg2"/>
+                  </a:outerShdw>
+                </a:effectLst>
+              </a14:hiddenEffects>
+            </a:ext>
+          </a:extLst>
+        </p:spPr>
+        <p:txBody>
+          <a:bodyPr vert="horz" wrap="square" lIns="0" tIns="0" rIns="0" bIns="0" numCol="1" anchor="ctr" anchorCtr="0" compatLnSpc="1">
+            <a:prstTxWarp prst="textNoShape">
+              <a:avLst/>
+            </a:prstTxWarp>
+            <a:spAutoFit/>
+          </a:bodyPr>
+          <a:lstStyle/>
+          <a:p>
+            <a:r>
+              <a:rPr lang="de-DE" sz="1600" dirty="0">
+                <a:solidFill>
+                  <a:srgbClr val="0000FF"/>
+                </a:solidFill>
+                <a:latin typeface="Consolas" panose="020B0609020204030204" pitchFamily="49" charset="0"/>
+              </a:rPr>
+              <a:t>&lt;</a:t>
+            </a:r>
+            <a:r>
+              <a:rPr lang="de-DE" sz="1600" dirty="0" err="1">
+                <a:solidFill>
+                  <a:srgbClr val="A31515"/>
+                </a:solidFill>
+                <a:latin typeface="Consolas" panose="020B0609020204030204" pitchFamily="49" charset="0"/>
+              </a:rPr>
+              <a:t>system.web</a:t>
+            </a:r>
+            <a:r>
+              <a:rPr lang="de-DE" sz="1600" dirty="0">
+                <a:solidFill>
+                  <a:srgbClr val="0000FF"/>
+                </a:solidFill>
+                <a:latin typeface="Consolas" panose="020B0609020204030204" pitchFamily="49" charset="0"/>
+              </a:rPr>
+              <a:t>&gt;</a:t>
+            </a:r>
+          </a:p>
+          <a:p>
+            <a:endParaRPr lang="de-DE" sz="1600" dirty="0">
+              <a:solidFill>
+                <a:srgbClr val="000000"/>
+              </a:solidFill>
+              <a:latin typeface="Consolas" panose="020B0609020204030204" pitchFamily="49" charset="0"/>
+            </a:endParaRPr>
+          </a:p>
+          <a:p>
+            <a:pPr lvl="1"/>
+            <a:r>
+              <a:rPr lang="de-DE" sz="1600" dirty="0">
+                <a:solidFill>
+                  <a:srgbClr val="0000FF"/>
+                </a:solidFill>
+                <a:latin typeface="Consolas" panose="020B0609020204030204" pitchFamily="49" charset="0"/>
+              </a:rPr>
+              <a:t>&lt;!--</a:t>
+            </a:r>
+            <a:r>
+              <a:rPr lang="de-DE" sz="1600" dirty="0">
+                <a:solidFill>
+                  <a:srgbClr val="008000"/>
+                </a:solidFill>
+                <a:latin typeface="Consolas" panose="020B0609020204030204" pitchFamily="49" charset="0"/>
+              </a:rPr>
+              <a:t>Modus Forms und </a:t>
+            </a:r>
+            <a:r>
+              <a:rPr lang="de-DE" sz="1600" dirty="0" err="1">
+                <a:solidFill>
+                  <a:srgbClr val="008000"/>
+                </a:solidFill>
+                <a:latin typeface="Consolas" panose="020B0609020204030204" pitchFamily="49" charset="0"/>
+              </a:rPr>
+              <a:t>Formauthentifikation</a:t>
+            </a:r>
+            <a:r>
+              <a:rPr lang="de-DE" sz="1600" dirty="0">
+                <a:solidFill>
+                  <a:srgbClr val="008000"/>
+                </a:solidFill>
+                <a:latin typeface="Consolas" panose="020B0609020204030204" pitchFamily="49" charset="0"/>
+              </a:rPr>
+              <a:t> erlauben</a:t>
+            </a:r>
+            <a:r>
+              <a:rPr lang="de-DE" sz="1600" dirty="0">
+                <a:solidFill>
+                  <a:srgbClr val="0000FF"/>
+                </a:solidFill>
+                <a:latin typeface="Consolas" panose="020B0609020204030204" pitchFamily="49" charset="0"/>
+              </a:rPr>
+              <a:t>--&gt; </a:t>
+            </a:r>
+            <a:endParaRPr lang="de-DE" sz="1600" dirty="0">
+              <a:solidFill>
+                <a:srgbClr val="000000"/>
+              </a:solidFill>
+              <a:latin typeface="Consolas" panose="020B0609020204030204" pitchFamily="49" charset="0"/>
+            </a:endParaRPr>
+          </a:p>
+          <a:p>
+            <a:pPr lvl="1"/>
+            <a:r>
+              <a:rPr lang="de-DE" sz="1600" dirty="0">
+                <a:solidFill>
+                  <a:srgbClr val="0000FF"/>
+                </a:solidFill>
+                <a:latin typeface="Consolas" panose="020B0609020204030204" pitchFamily="49" charset="0"/>
+              </a:rPr>
+              <a:t>&lt;</a:t>
+            </a:r>
+            <a:r>
+              <a:rPr lang="de-DE" sz="1600" dirty="0" err="1">
+                <a:solidFill>
+                  <a:srgbClr val="A31515"/>
+                </a:solidFill>
+                <a:latin typeface="Consolas" panose="020B0609020204030204" pitchFamily="49" charset="0"/>
+              </a:rPr>
+              <a:t>authentication</a:t>
+            </a:r>
+            <a:r>
+              <a:rPr lang="de-DE" sz="1600" dirty="0">
+                <a:solidFill>
+                  <a:srgbClr val="0000FF"/>
+                </a:solidFill>
+                <a:latin typeface="Consolas" panose="020B0609020204030204" pitchFamily="49" charset="0"/>
+              </a:rPr>
               <a:t> </a:t>
+            </a:r>
+            <a:r>
+              <a:rPr lang="de-DE" sz="1600" dirty="0" err="1">
+                <a:solidFill>
+                  <a:srgbClr val="FF0000"/>
+                </a:solidFill>
+                <a:latin typeface="Consolas" panose="020B0609020204030204" pitchFamily="49" charset="0"/>
+              </a:rPr>
+              <a:t>mode</a:t>
+            </a:r>
+            <a:r>
+              <a:rPr lang="de-DE" sz="1600" dirty="0">
+                <a:solidFill>
+                  <a:srgbClr val="0000FF"/>
+                </a:solidFill>
+                <a:latin typeface="Consolas" panose="020B0609020204030204" pitchFamily="49" charset="0"/>
+              </a:rPr>
+              <a:t>="Forms"/&gt;</a:t>
+            </a:r>
+            <a:endParaRPr lang="de-DE" sz="1600" dirty="0">
+              <a:solidFill>
+                <a:srgbClr val="000000"/>
+              </a:solidFill>
+              <a:latin typeface="Consolas" panose="020B0609020204030204" pitchFamily="49" charset="0"/>
+            </a:endParaRPr>
+          </a:p>
+          <a:p>
+            <a:r>
+              <a:rPr lang="de-DE" sz="1600" dirty="0">
+                <a:solidFill>
+                  <a:srgbClr val="0000FF"/>
+                </a:solidFill>
+                <a:latin typeface="Consolas" panose="020B0609020204030204" pitchFamily="49" charset="0"/>
+              </a:rPr>
+              <a:t>&lt;/</a:t>
+            </a:r>
+            <a:r>
+              <a:rPr lang="de-DE" sz="1600" dirty="0" err="1">
+                <a:solidFill>
+                  <a:srgbClr val="A31515"/>
+                </a:solidFill>
+                <a:latin typeface="Consolas" panose="020B0609020204030204" pitchFamily="49" charset="0"/>
+              </a:rPr>
+              <a:t>system.web</a:t>
+            </a:r>
+            <a:r>
+              <a:rPr lang="de-DE" sz="1600" dirty="0">
+                <a:solidFill>
+                  <a:srgbClr val="0000FF"/>
+                </a:solidFill>
+                <a:latin typeface="Consolas" panose="020B0609020204030204" pitchFamily="49" charset="0"/>
+              </a:rPr>
+              <a:t>&gt;</a:t>
+            </a:r>
+            <a:endParaRPr kumimoji="0" lang="de-DE" altLang="de-DE" sz="1600" b="0" i="0" u="none" strike="noStrike" cap="none" normalizeH="0" baseline="0" dirty="0">
+              <a:ln>
+                <a:noFill/>
+              </a:ln>
+              <a:solidFill>
+                <a:schemeClr val="tx1"/>
+              </a:solidFill>
+              <a:effectLst/>
+              <a:latin typeface="Consolas" panose="020B0609020204030204" pitchFamily="49" charset="0"/>
+            </a:endParaRPr>
+          </a:p>
+        </p:txBody>
+      </p:sp>
+      <p:sp>
+        <p:nvSpPr>
+          <p:cNvPr id="7" name="Textfeld 6"/>
+          <p:cNvSpPr txBox="1"/>
+          <p:nvPr/>
+        </p:nvSpPr>
+        <p:spPr>
+          <a:xfrm>
+            <a:off x="846992" y="1902743"/>
+            <a:ext cx="4859215" cy="461665"/>
+          </a:xfrm>
+          <a:prstGeom prst="rect">
+            <a:avLst/>
+          </a:prstGeom>
+          <a:noFill/>
+        </p:spPr>
+        <p:txBody>
+          <a:bodyPr wrap="square" rtlCol="0">
+            <a:spAutoFit/>
+          </a:bodyPr>
+          <a:lstStyle/>
+          <a:p>
+            <a:r>
+              <a:rPr lang="de-DE" sz="2400" dirty="0" err="1">
+                <a:latin typeface="Century Gothic" panose="020B0502020202020204" pitchFamily="34" charset="0"/>
+              </a:rPr>
+              <a:t>web.config</a:t>
+            </a:r>
+            <a:endParaRPr lang="de-DE" sz="2400" dirty="0">
+              <a:latin typeface="Century Gothic" panose="020B0502020202020204" pitchFamily="34" charset="0"/>
+            </a:endParaRPr>
+          </a:p>
+        </p:txBody>
+      </p:sp>
+    </p:spTree>
+    <p:extLst>
+      <p:ext uri="{BB962C8B-B14F-4D97-AF65-F5344CB8AC3E}">
+        <p14:creationId xmlns:p14="http://schemas.microsoft.com/office/powerpoint/2010/main" val="3555879107"/>
+      </p:ext>
+    </p:extLst>
+  </p:cSld>
+  <p:clrMapOvr>
+    <a:masterClrMapping/>
+  </p:clrMapOvr>
+  <p:transition spd="slow">
+    <p:fade/>
+  </p:transition>
+  <p:timing>
+    <p:tnLst>
+      <p:par>
+        <p:cTn id="1" dur="indefinite" restart="never" nodeType="tmRoot"/>
+      </p:par>
+    </p:tnLst>
+  </p:timing>
+</p:sld>
+</file>
+
+<file path=ppt/slides/slide14.xml><?xml version="1.0" encoding="utf-8"?>
+<p:sld xmlns:a="http://schemas.openxmlformats.org/drawingml/2006/main" xmlns:r="http://schemas.openxmlformats.org/officeDocument/2006/relationships" xmlns:p="http://schemas.openxmlformats.org/presentationml/2006/main">
+  <p:cSld>
+    <p:spTree>
+      <p:nvGrpSpPr>
+        <p:cNvPr id="1" name=""/>
+        <p:cNvGrpSpPr/>
+        <p:nvPr/>
+      </p:nvGrpSpPr>
+      <p:grpSpPr>
+        <a:xfrm>
+          <a:off x="0" y="0"/>
+          <a:ext cx="0" cy="0"/>
+          <a:chOff x="0" y="0"/>
+          <a:chExt cx="0" cy="0"/>
+        </a:xfrm>
+      </p:grpSpPr>
+      <p:sp>
+        <p:nvSpPr>
+          <p:cNvPr id="1029" name="Rectangle 2"/>
+          <p:cNvSpPr>
+            <a:spLocks noGrp="1" noChangeArrowheads="1"/>
+          </p:cNvSpPr>
+          <p:nvPr>
+            <p:ph type="title" idx="4294967295"/>
+          </p:nvPr>
+        </p:nvSpPr>
+        <p:spPr/>
+        <p:txBody>
+          <a:bodyPr>
+            <a:normAutofit/>
+          </a:bodyPr>
+          <a:lstStyle/>
+          <a:p>
+            <a:r>
+              <a:rPr lang="en-US" altLang="de-DE" sz="5400" dirty="0">
+                <a:solidFill>
+                  <a:schemeClr val="bg1">
+                    <a:lumMod val="65000"/>
+                  </a:schemeClr>
+                </a:solidFill>
+                <a:latin typeface="Century Gothic" panose="020B0502020202020204" pitchFamily="34" charset="0"/>
+                <a:ea typeface="+mn-ea"/>
+                <a:cs typeface="+mn-cs"/>
+              </a:rPr>
+              <a:t>Form </a:t>
             </a:r>
             <a:r>
               <a:rPr lang="en-US" altLang="de-DE" sz="5400" dirty="0" err="1">
@@ -12138,7 +11875,7 @@
         <p:spPr>
           <a:xfrm>
             <a:off x="838199" y="2295695"/>
-            <a:ext cx="9413631" cy="1554272"/>
+            <a:ext cx="9413631" cy="2800767"/>
           </a:xfrm>
           <a:prstGeom prst="rect">
             <a:avLst/>
@@ -12150,266 +11887,385 @@
           </a:bodyPr>
           <a:lstStyle/>
           <a:p>
-            <a:pPr lvl="0" eaLnBrk="0" fontAlgn="base" hangingPunct="0">
-              <a:spcBef>
-                <a:spcPts val="600"/>
-              </a:spcBef>
-              <a:spcAft>
-                <a:spcPct val="0"/>
-              </a:spcAft>
-            </a:pPr>
-            <a:r>
-              <a:rPr lang="de-DE" altLang="de-DE" sz="2000" dirty="0" err="1">
+            <a:r>
+              <a:rPr lang="en-US" sz="1600" dirty="0">
+                <a:solidFill>
+                  <a:srgbClr val="0000FF"/>
+                </a:solidFill>
+                <a:latin typeface="Consolas" panose="020B0609020204030204" pitchFamily="49" charset="0"/>
+              </a:rPr>
+              <a:t>void</a:t>
+            </a:r>
+            <a:r>
+              <a:rPr lang="en-US" sz="1600" dirty="0">
+                <a:solidFill>
+                  <a:srgbClr val="000000"/>
+                </a:solidFill>
+                <a:latin typeface="Consolas" panose="020B0609020204030204" pitchFamily="49" charset="0"/>
+              </a:rPr>
+              <a:t> </a:t>
+            </a:r>
+            <a:r>
+              <a:rPr lang="en-US" sz="1600" dirty="0" err="1">
+                <a:solidFill>
+                  <a:srgbClr val="000000"/>
+                </a:solidFill>
+                <a:latin typeface="Consolas" panose="020B0609020204030204" pitchFamily="49" charset="0"/>
+              </a:rPr>
+              <a:t>Logon_Click</a:t>
+            </a:r>
+            <a:r>
+              <a:rPr lang="en-US" sz="1600" dirty="0">
+                <a:solidFill>
+                  <a:srgbClr val="000000"/>
+                </a:solidFill>
+                <a:latin typeface="Consolas" panose="020B0609020204030204" pitchFamily="49" charset="0"/>
+              </a:rPr>
+              <a:t>(</a:t>
+            </a:r>
+            <a:r>
+              <a:rPr lang="en-US" sz="1600" dirty="0">
+                <a:solidFill>
+                  <a:srgbClr val="0000FF"/>
+                </a:solidFill>
+                <a:latin typeface="Consolas" panose="020B0609020204030204" pitchFamily="49" charset="0"/>
+              </a:rPr>
+              <a:t>object</a:t>
+            </a:r>
+            <a:r>
+              <a:rPr lang="en-US" sz="1600" dirty="0">
+                <a:solidFill>
+                  <a:srgbClr val="000000"/>
+                </a:solidFill>
+                <a:latin typeface="Consolas" panose="020B0609020204030204" pitchFamily="49" charset="0"/>
+              </a:rPr>
+              <a:t> sender, </a:t>
+            </a:r>
+            <a:r>
+              <a:rPr lang="en-US" sz="1600" dirty="0" err="1">
                 <a:solidFill>
                   <a:srgbClr val="2B91AF"/>
                 </a:solidFill>
                 <a:latin typeface="Consolas" panose="020B0609020204030204" pitchFamily="49" charset="0"/>
               </a:rPr>
-              <a:t>HttpClientHandler</a:t>
-            </a:r>
-            <a:r>
-              <a:rPr lang="de-DE" altLang="de-DE" sz="2000" dirty="0">
+              <a:t>EventArgs</a:t>
+            </a:r>
+            <a:r>
+              <a:rPr lang="en-US" sz="1600" dirty="0">
                 <a:solidFill>
                   <a:srgbClr val="000000"/>
                 </a:solidFill>
                 <a:latin typeface="Consolas" panose="020B0609020204030204" pitchFamily="49" charset="0"/>
               </a:rPr>
+              <a:t> e)</a:t>
+            </a:r>
+          </a:p>
+          <a:p>
+            <a:r>
+              <a:rPr lang="de-DE" sz="1600" dirty="0">
+                <a:solidFill>
+                  <a:srgbClr val="000000"/>
+                </a:solidFill>
+                <a:latin typeface="Consolas" panose="020B0609020204030204" pitchFamily="49" charset="0"/>
+              </a:rPr>
+              <a:t>{</a:t>
+            </a:r>
+          </a:p>
+          <a:p>
+            <a:r>
+              <a:rPr lang="de-DE" sz="1600" dirty="0">
+                <a:solidFill>
+                  <a:srgbClr val="000000"/>
+                </a:solidFill>
+                <a:latin typeface="Consolas" panose="020B0609020204030204" pitchFamily="49" charset="0"/>
+              </a:rPr>
+              <a:t>    </a:t>
+            </a:r>
+            <a:r>
+              <a:rPr lang="de-DE" sz="1600" dirty="0" err="1">
+                <a:solidFill>
+                  <a:srgbClr val="0000FF"/>
+                </a:solidFill>
+                <a:latin typeface="Consolas" panose="020B0609020204030204" pitchFamily="49" charset="0"/>
+              </a:rPr>
+              <a:t>if</a:t>
+            </a:r>
+            <a:r>
+              <a:rPr lang="de-DE" sz="1600" dirty="0">
+                <a:solidFill>
+                  <a:srgbClr val="000000"/>
+                </a:solidFill>
+                <a:latin typeface="Consolas" panose="020B0609020204030204" pitchFamily="49" charset="0"/>
+              </a:rPr>
+              <a:t> ((</a:t>
+            </a:r>
+            <a:r>
+              <a:rPr lang="de-DE" sz="1600" dirty="0" err="1">
+                <a:solidFill>
+                  <a:srgbClr val="000000"/>
+                </a:solidFill>
+                <a:latin typeface="Consolas" panose="020B0609020204030204" pitchFamily="49" charset="0"/>
+              </a:rPr>
+              <a:t>UserEmail.Text</a:t>
+            </a:r>
+            <a:r>
+              <a:rPr lang="de-DE" sz="1600" dirty="0">
+                <a:solidFill>
+                  <a:srgbClr val="000000"/>
+                </a:solidFill>
+                <a:latin typeface="Consolas" panose="020B0609020204030204" pitchFamily="49" charset="0"/>
+              </a:rPr>
+              <a:t> == </a:t>
+            </a:r>
+            <a:r>
+              <a:rPr lang="de-DE" sz="1600" dirty="0">
+                <a:solidFill>
+                  <a:srgbClr val="A31515"/>
+                </a:solidFill>
+                <a:latin typeface="Consolas" panose="020B0609020204030204" pitchFamily="49" charset="0"/>
+              </a:rPr>
+              <a:t>"jchen@contoso.com"</a:t>
+            </a:r>
+            <a:r>
+              <a:rPr lang="de-DE" sz="1600" dirty="0">
+                <a:solidFill>
+                  <a:srgbClr val="000000"/>
+                </a:solidFill>
+                <a:latin typeface="Consolas" panose="020B0609020204030204" pitchFamily="49" charset="0"/>
+              </a:rPr>
+              <a:t>) &amp;&amp; (</a:t>
+            </a:r>
+            <a:r>
+              <a:rPr lang="de-DE" sz="1600" dirty="0" err="1">
+                <a:solidFill>
+                  <a:srgbClr val="000000"/>
+                </a:solidFill>
+                <a:latin typeface="Consolas" panose="020B0609020204030204" pitchFamily="49" charset="0"/>
+              </a:rPr>
+              <a:t>UserPass.Text</a:t>
+            </a:r>
+            <a:r>
+              <a:rPr lang="de-DE" sz="1600" dirty="0">
+                <a:solidFill>
+                  <a:srgbClr val="000000"/>
+                </a:solidFill>
+                <a:latin typeface="Consolas" panose="020B0609020204030204" pitchFamily="49" charset="0"/>
+              </a:rPr>
+              <a:t> == </a:t>
+            </a:r>
+            <a:r>
+              <a:rPr lang="de-DE" sz="1600" dirty="0">
+                <a:solidFill>
+                  <a:srgbClr val="A31515"/>
+                </a:solidFill>
+                <a:latin typeface="Consolas" panose="020B0609020204030204" pitchFamily="49" charset="0"/>
+              </a:rPr>
+              <a:t>"37Yj*99Ps"</a:t>
+            </a:r>
+            <a:r>
+              <a:rPr lang="de-DE" sz="1600" dirty="0">
+                <a:solidFill>
+                  <a:srgbClr val="000000"/>
+                </a:solidFill>
+                <a:latin typeface="Consolas" panose="020B0609020204030204" pitchFamily="49" charset="0"/>
+              </a:rPr>
+              <a:t>))</a:t>
+            </a:r>
+          </a:p>
+          <a:p>
+            <a:r>
+              <a:rPr lang="de-DE" sz="1600" dirty="0">
+                <a:solidFill>
+                  <a:srgbClr val="000000"/>
+                </a:solidFill>
+                <a:latin typeface="Consolas" panose="020B0609020204030204" pitchFamily="49" charset="0"/>
+              </a:rPr>
+              <a:t>    {</a:t>
+            </a:r>
+          </a:p>
+          <a:p>
+            <a:pPr lvl="0"/>
+            <a:r>
+              <a:rPr lang="de-DE" sz="1600" dirty="0">
+                <a:solidFill>
+                  <a:srgbClr val="000000"/>
+                </a:solidFill>
+                <a:latin typeface="Consolas" panose="020B0609020204030204" pitchFamily="49" charset="0"/>
+              </a:rPr>
+              <a:t> 	</a:t>
+            </a:r>
+            <a:r>
+              <a:rPr lang="de-DE" altLang="de-DE" sz="1600" dirty="0" err="1">
+                <a:solidFill>
+                  <a:srgbClr val="0000FF"/>
+                </a:solidFill>
+                <a:latin typeface="Consolas" panose="020B0609020204030204" pitchFamily="49" charset="0"/>
+              </a:rPr>
+              <a:t>Authentication.RedirectFromLoginPage</a:t>
+            </a:r>
+            <a:r>
+              <a:rPr lang="de-DE" altLang="de-DE" sz="1600" dirty="0">
+                <a:latin typeface="Consolas" panose="020B0609020204030204" pitchFamily="49" charset="0"/>
+              </a:rPr>
+              <a:t>(</a:t>
+            </a:r>
+            <a:r>
+              <a:rPr lang="de-DE" sz="1600" dirty="0" err="1">
+                <a:latin typeface="Consolas" panose="020B0609020204030204" pitchFamily="49" charset="0"/>
+              </a:rPr>
+              <a:t>UserEmail</a:t>
+            </a:r>
+            <a:r>
+              <a:rPr lang="de-DE" altLang="de-DE" sz="1600" dirty="0" err="1">
+                <a:latin typeface="Consolas" panose="020B0609020204030204" pitchFamily="49" charset="0"/>
+              </a:rPr>
+              <a:t>.Value</a:t>
+            </a:r>
+            <a:r>
+              <a:rPr lang="de-DE" altLang="de-DE" sz="1600" dirty="0">
+                <a:latin typeface="Consolas" panose="020B0609020204030204" pitchFamily="49" charset="0"/>
+              </a:rPr>
+              <a:t>, </a:t>
+            </a:r>
+            <a:r>
+              <a:rPr lang="de-DE" sz="1600" dirty="0" err="1">
+                <a:latin typeface="Consolas" panose="020B0609020204030204" pitchFamily="49" charset="0"/>
+              </a:rPr>
+              <a:t>Persist</a:t>
+            </a:r>
+            <a:r>
+              <a:rPr lang="de-DE" altLang="de-DE" sz="1600" dirty="0" err="1">
+                <a:latin typeface="Consolas" panose="020B0609020204030204" pitchFamily="49" charset="0"/>
+              </a:rPr>
+              <a:t>.Checked</a:t>
+            </a:r>
+            <a:r>
+              <a:rPr lang="de-DE" altLang="de-DE" sz="1600" dirty="0">
+                <a:solidFill>
+                  <a:srgbClr val="000000"/>
+                </a:solidFill>
+                <a:latin typeface="Consolas" panose="020B0609020204030204" pitchFamily="49" charset="0"/>
+              </a:rPr>
+              <a:t>);</a:t>
+            </a:r>
+            <a:r>
+              <a:rPr lang="de-DE" altLang="de-DE" sz="1200" dirty="0">
+                <a:latin typeface="Consolas" panose="020B0609020204030204" pitchFamily="49" charset="0"/>
+              </a:rPr>
               <a:t> </a:t>
             </a:r>
-            <a:r>
-              <a:rPr lang="de-DE" altLang="de-DE" sz="2000" dirty="0" err="1">
+            <a:endParaRPr lang="de-DE" sz="1600" dirty="0">
+              <a:solidFill>
+                <a:srgbClr val="000000"/>
+              </a:solidFill>
+              <a:latin typeface="Consolas" panose="020B0609020204030204" pitchFamily="49" charset="0"/>
+            </a:endParaRPr>
+          </a:p>
+          <a:p>
+            <a:r>
+              <a:rPr lang="de-DE" sz="1600" dirty="0">
                 <a:solidFill>
                   <a:srgbClr val="000000"/>
                 </a:solidFill>
                 <a:latin typeface="Consolas" panose="020B0609020204030204" pitchFamily="49" charset="0"/>
               </a:rPr>
-              <a:t>handler</a:t>
-            </a:r>
-            <a:r>
-              <a:rPr lang="de-DE" altLang="de-DE" sz="2000" dirty="0">
+              <a:t>    }</a:t>
+            </a:r>
+          </a:p>
+          <a:p>
+            <a:r>
+              <a:rPr lang="de-DE" sz="1600" dirty="0">
                 <a:solidFill>
                   <a:srgbClr val="000000"/>
                 </a:solidFill>
                 <a:latin typeface="Consolas" panose="020B0609020204030204" pitchFamily="49" charset="0"/>
               </a:rPr>
-              <a:t> = </a:t>
-            </a:r>
-            <a:r>
-              <a:rPr lang="de-DE" altLang="de-DE" sz="2000" dirty="0" err="1">
+              <a:t>    </a:t>
+            </a:r>
+            <a:r>
+              <a:rPr lang="de-DE" sz="1600" dirty="0" err="1">
                 <a:solidFill>
                   <a:srgbClr val="0000FF"/>
                 </a:solidFill>
                 <a:latin typeface="Consolas" panose="020B0609020204030204" pitchFamily="49" charset="0"/>
               </a:rPr>
-              <a:t>new</a:t>
-            </a:r>
-            <a:r>
-              <a:rPr lang="de-DE" altLang="de-DE" sz="2000" dirty="0">
+              <a:t>else</a:t>
+            </a:r>
+            <a:endParaRPr lang="de-DE" sz="1600" dirty="0">
+              <a:solidFill>
+                <a:srgbClr val="000000"/>
+              </a:solidFill>
+              <a:latin typeface="Consolas" panose="020B0609020204030204" pitchFamily="49" charset="0"/>
+            </a:endParaRPr>
+          </a:p>
+          <a:p>
+            <a:r>
+              <a:rPr lang="de-DE" sz="1600" dirty="0">
                 <a:solidFill>
                   <a:srgbClr val="000000"/>
                 </a:solidFill>
                 <a:latin typeface="Consolas" panose="020B0609020204030204" pitchFamily="49" charset="0"/>
               </a:rPr>
-              <a:t> </a:t>
-            </a:r>
-            <a:r>
-              <a:rPr lang="de-DE" altLang="de-DE" sz="2000" dirty="0" err="1">
-                <a:solidFill>
-                  <a:srgbClr val="2B91AF"/>
-                </a:solidFill>
-                <a:latin typeface="Consolas" panose="020B0609020204030204" pitchFamily="49" charset="0"/>
-              </a:rPr>
-              <a:t>HttpClientHandler</a:t>
-            </a:r>
-            <a:r>
-              <a:rPr lang="de-DE" altLang="de-DE" sz="2000" dirty="0">
+              <a:t>    {</a:t>
+            </a:r>
+          </a:p>
+          <a:p>
+            <a:r>
+              <a:rPr lang="en-US" sz="1600" dirty="0">
                 <a:solidFill>
                   <a:srgbClr val="000000"/>
                 </a:solidFill>
                 <a:latin typeface="Consolas" panose="020B0609020204030204" pitchFamily="49" charset="0"/>
               </a:rPr>
-              <a:t>() { </a:t>
-            </a:r>
-          </a:p>
-          <a:p>
-            <a:pPr lvl="0" eaLnBrk="0" fontAlgn="base" hangingPunct="0">
-              <a:spcBef>
-                <a:spcPts val="600"/>
-              </a:spcBef>
-              <a:spcAft>
-                <a:spcPct val="0"/>
-              </a:spcAft>
-            </a:pPr>
-            <a:r>
-              <a:rPr lang="de-DE" altLang="de-DE" sz="2000" dirty="0">
+              <a:t>        </a:t>
+            </a:r>
+            <a:r>
+              <a:rPr lang="en-US" sz="1600" dirty="0">
+                <a:solidFill>
+                  <a:srgbClr val="008000"/>
+                </a:solidFill>
+                <a:latin typeface="Consolas" panose="020B0609020204030204" pitchFamily="49" charset="0"/>
+              </a:rPr>
+              <a:t>//</a:t>
+            </a:r>
+            <a:r>
+              <a:rPr lang="en-US" sz="1600" dirty="0" err="1">
+                <a:solidFill>
+                  <a:srgbClr val="008000"/>
+                </a:solidFill>
+                <a:latin typeface="Consolas" panose="020B0609020204030204" pitchFamily="49" charset="0"/>
+              </a:rPr>
+              <a:t>Errormessage</a:t>
+            </a:r>
+            <a:endParaRPr lang="en-US" sz="1600" dirty="0">
+              <a:solidFill>
+                <a:srgbClr val="008000"/>
+              </a:solidFill>
+              <a:latin typeface="Consolas" panose="020B0609020204030204" pitchFamily="49" charset="0"/>
+            </a:endParaRPr>
+          </a:p>
+          <a:p>
+            <a:r>
+              <a:rPr lang="de-DE" sz="1600" dirty="0">
                 <a:solidFill>
                   <a:srgbClr val="000000"/>
                 </a:solidFill>
                 <a:latin typeface="Consolas" panose="020B0609020204030204" pitchFamily="49" charset="0"/>
               </a:rPr>
-              <a:t>	</a:t>
-            </a:r>
-            <a:r>
-              <a:rPr lang="de-DE" altLang="de-DE" sz="2000" dirty="0" err="1">
-                <a:solidFill>
-                  <a:srgbClr val="2B91AF"/>
-                </a:solidFill>
-                <a:latin typeface="Consolas" panose="020B0609020204030204" pitchFamily="49" charset="0"/>
-              </a:rPr>
-              <a:t>UseDefaultCredentials</a:t>
-            </a:r>
-            <a:r>
-              <a:rPr lang="de-DE" altLang="de-DE" sz="2000" dirty="0">
+              <a:t>    }</a:t>
+            </a:r>
+          </a:p>
+          <a:p>
+            <a:r>
+              <a:rPr lang="de-DE" sz="1600" dirty="0">
                 <a:solidFill>
                   <a:srgbClr val="000000"/>
                 </a:solidFill>
                 <a:latin typeface="Consolas" panose="020B0609020204030204" pitchFamily="49" charset="0"/>
               </a:rPr>
-              <a:t> = </a:t>
-            </a:r>
-            <a:r>
-              <a:rPr lang="de-DE" altLang="de-DE" sz="2000" dirty="0" err="1">
-                <a:solidFill>
-                  <a:srgbClr val="0000FF"/>
-                </a:solidFill>
-                <a:latin typeface="Consolas" panose="020B0609020204030204" pitchFamily="49" charset="0"/>
-              </a:rPr>
-              <a:t>true</a:t>
-            </a:r>
-            <a:r>
-              <a:rPr lang="de-DE" altLang="de-DE" sz="2000" dirty="0">
-                <a:solidFill>
-                  <a:srgbClr val="000000"/>
-                </a:solidFill>
-                <a:latin typeface="Consolas" panose="020B0609020204030204" pitchFamily="49" charset="0"/>
-              </a:rPr>
-              <a:t> </a:t>
-            </a:r>
-          </a:p>
-          <a:p>
-            <a:pPr lvl="0" eaLnBrk="0" fontAlgn="base" hangingPunct="0">
-              <a:spcBef>
-                <a:spcPts val="600"/>
-              </a:spcBef>
-              <a:spcAft>
-                <a:spcPct val="0"/>
-              </a:spcAft>
-            </a:pPr>
-            <a:r>
-              <a:rPr lang="de-DE" altLang="de-DE" sz="2000" dirty="0">
-                <a:solidFill>
-                  <a:srgbClr val="000000"/>
-                </a:solidFill>
-                <a:latin typeface="Consolas" panose="020B0609020204030204" pitchFamily="49" charset="0"/>
-              </a:rPr>
-              <a:t>}; </a:t>
-            </a:r>
-          </a:p>
-          <a:p>
-            <a:pPr lvl="0" eaLnBrk="0" fontAlgn="base" hangingPunct="0">
-              <a:spcBef>
-                <a:spcPts val="600"/>
-              </a:spcBef>
-              <a:spcAft>
-                <a:spcPct val="0"/>
-              </a:spcAft>
-            </a:pPr>
-            <a:r>
-              <a:rPr lang="de-DE" altLang="de-DE" sz="2000" dirty="0" err="1">
-                <a:solidFill>
-                  <a:srgbClr val="2B91AF"/>
-                </a:solidFill>
-                <a:latin typeface="Consolas" panose="020B0609020204030204" pitchFamily="49" charset="0"/>
-              </a:rPr>
-              <a:t>HttpClient</a:t>
-            </a:r>
-            <a:r>
-              <a:rPr lang="de-DE" altLang="de-DE" sz="2000" dirty="0">
-                <a:solidFill>
-                  <a:srgbClr val="000000"/>
-                </a:solidFill>
-                <a:latin typeface="Consolas" panose="020B0609020204030204" pitchFamily="49" charset="0"/>
-              </a:rPr>
-              <a:t> </a:t>
-            </a:r>
-            <a:r>
-              <a:rPr lang="de-DE" altLang="de-DE" sz="2000" dirty="0" err="1">
-                <a:solidFill>
-                  <a:srgbClr val="000000"/>
-                </a:solidFill>
-                <a:latin typeface="Consolas" panose="020B0609020204030204" pitchFamily="49" charset="0"/>
-              </a:rPr>
-              <a:t>client</a:t>
-            </a:r>
-            <a:r>
-              <a:rPr lang="de-DE" altLang="de-DE" sz="2000" dirty="0">
-                <a:solidFill>
-                  <a:srgbClr val="000000"/>
-                </a:solidFill>
-                <a:latin typeface="Consolas" panose="020B0609020204030204" pitchFamily="49" charset="0"/>
-              </a:rPr>
-              <a:t> = </a:t>
-            </a:r>
-            <a:r>
-              <a:rPr lang="de-DE" altLang="de-DE" sz="2000" dirty="0" err="1">
-                <a:solidFill>
-                  <a:srgbClr val="0000FF"/>
-                </a:solidFill>
-                <a:latin typeface="Consolas" panose="020B0609020204030204" pitchFamily="49" charset="0"/>
-              </a:rPr>
-              <a:t>new</a:t>
-            </a:r>
-            <a:r>
-              <a:rPr lang="de-DE" altLang="de-DE" sz="2000" dirty="0">
-                <a:solidFill>
-                  <a:srgbClr val="000000"/>
-                </a:solidFill>
-                <a:latin typeface="Consolas" panose="020B0609020204030204" pitchFamily="49" charset="0"/>
-              </a:rPr>
-              <a:t> </a:t>
-            </a:r>
-            <a:r>
-              <a:rPr lang="de-DE" altLang="de-DE" sz="2000" dirty="0" err="1">
-                <a:solidFill>
-                  <a:srgbClr val="2B91AF"/>
-                </a:solidFill>
-                <a:latin typeface="Consolas" panose="020B0609020204030204" pitchFamily="49" charset="0"/>
-              </a:rPr>
-              <a:t>HttpClient</a:t>
-            </a:r>
-            <a:r>
-              <a:rPr lang="de-DE" altLang="de-DE" sz="2000" dirty="0">
-                <a:solidFill>
-                  <a:srgbClr val="000000"/>
-                </a:solidFill>
-                <a:latin typeface="Consolas" panose="020B0609020204030204" pitchFamily="49" charset="0"/>
-              </a:rPr>
-              <a:t>(</a:t>
-            </a:r>
-            <a:r>
-              <a:rPr lang="de-DE" altLang="de-DE" sz="2000" dirty="0" err="1">
-                <a:solidFill>
-                  <a:srgbClr val="000000"/>
-                </a:solidFill>
-                <a:latin typeface="Consolas" panose="020B0609020204030204" pitchFamily="49" charset="0"/>
-              </a:rPr>
-              <a:t>handler</a:t>
-            </a:r>
-            <a:r>
-              <a:rPr lang="de-DE" altLang="de-DE" sz="2000" dirty="0">
-                <a:solidFill>
-                  <a:srgbClr val="000000"/>
-                </a:solidFill>
-                <a:latin typeface="Consolas" panose="020B0609020204030204" pitchFamily="49" charset="0"/>
-              </a:rPr>
-              <a:t>);</a:t>
-            </a:r>
-            <a:r>
-              <a:rPr lang="de-DE" altLang="de-DE" sz="2000" dirty="0">
-                <a:latin typeface="Consolas" panose="020B0609020204030204" pitchFamily="49" charset="0"/>
-              </a:rPr>
-              <a:t> </a:t>
-            </a:r>
+              <a:t>}</a:t>
+            </a:r>
+            <a:endParaRPr lang="de-DE" sz="1600" dirty="0"/>
           </a:p>
         </p:txBody>
       </p:sp>
@@ -13055,381 +12911,7 @@
     </p:spTree>
     <p:extLst>
       <p:ext uri="{BB962C8B-B14F-4D97-AF65-F5344CB8AC3E}">
-        <p14:creationId xmlns:p14="http://schemas.microsoft.com/office/powerpoint/2010/main" val="1934870808"/>
-      </p:ext>
-    </p:extLst>
-  </p:cSld>
-  <p:clrMapOvr>
-    <a:masterClrMapping/>
-  </p:clrMapOvr>
-  <p:transition spd="slow">
-    <p:fade/>
-  </p:transition>
-  <p:timing>
-    <p:tnLst>
-      <p:par>
-        <p:cTn id="1" dur="indefinite" restart="never" nodeType="tmRoot"/>
-      </p:par>
-    </p:tnLst>
-  </p:timing>
-</p:sld>
-</file>
-
-<file path=ppt/slides/slide14.xml><?xml version="1.0" encoding="utf-8"?>
-<p:sld xmlns:a="http://schemas.openxmlformats.org/drawingml/2006/main" xmlns:r="http://schemas.openxmlformats.org/officeDocument/2006/relationships" xmlns:p="http://schemas.openxmlformats.org/presentationml/2006/main">
-  <p:cSld>
-    <p:spTree>
-      <p:nvGrpSpPr>
-        <p:cNvPr id="1" name=""/>
-        <p:cNvGrpSpPr/>
-        <p:nvPr/>
-      </p:nvGrpSpPr>
-      <p:grpSpPr>
-        <a:xfrm>
-          <a:off x="0" y="0"/>
-          <a:ext cx="0" cy="0"/>
-          <a:chOff x="0" y="0"/>
-          <a:chExt cx="0" cy="0"/>
-        </a:xfrm>
-      </p:grpSpPr>
-      <p:sp>
-        <p:nvSpPr>
-          <p:cNvPr id="1029" name="Rectangle 2"/>
-          <p:cNvSpPr>
-            <a:spLocks noGrp="1" noChangeArrowheads="1"/>
-          </p:cNvSpPr>
-          <p:nvPr>
-            <p:ph type="title" idx="4294967295"/>
-          </p:nvPr>
-        </p:nvSpPr>
-        <p:spPr/>
-        <p:txBody>
-          <a:bodyPr>
-            <a:normAutofit/>
-          </a:bodyPr>
-          <a:lstStyle/>
-          <a:p>
-            <a:r>
-              <a:rPr lang="en-US" altLang="de-DE" sz="5400" dirty="0">
-                <a:solidFill>
-                  <a:schemeClr val="bg1">
-                    <a:lumMod val="65000"/>
-                  </a:schemeClr>
-                </a:solidFill>
-                <a:latin typeface="Century Gothic" panose="020B0502020202020204" pitchFamily="34" charset="0"/>
-                <a:ea typeface="+mn-ea"/>
-                <a:cs typeface="+mn-cs"/>
-              </a:rPr>
-              <a:t>Form </a:t>
-            </a:r>
-            <a:r>
-              <a:rPr lang="en-US" altLang="de-DE" sz="5400" dirty="0" err="1">
-                <a:solidFill>
-                  <a:schemeClr val="bg1">
-                    <a:lumMod val="65000"/>
-                  </a:schemeClr>
-                </a:solidFill>
-                <a:latin typeface="Century Gothic" panose="020B0502020202020204" pitchFamily="34" charset="0"/>
-                <a:ea typeface="+mn-ea"/>
-                <a:cs typeface="+mn-cs"/>
-              </a:rPr>
-              <a:t>Authentifikation</a:t>
-            </a:r>
-            <a:endParaRPr lang="en-US" altLang="de-DE" sz="5400" dirty="0">
-              <a:solidFill>
-                <a:schemeClr val="bg1">
-                  <a:lumMod val="65000"/>
-                </a:schemeClr>
-              </a:solidFill>
-              <a:latin typeface="Century Gothic" panose="020B0502020202020204" pitchFamily="34" charset="0"/>
-              <a:ea typeface="+mn-ea"/>
-              <a:cs typeface="+mn-cs"/>
-            </a:endParaRPr>
-          </a:p>
-        </p:txBody>
-      </p:sp>
-      <p:sp>
-        <p:nvSpPr>
-          <p:cNvPr id="3" name="Rectangle 1"/>
-          <p:cNvSpPr>
-            <a:spLocks noChangeArrowheads="1"/>
-          </p:cNvSpPr>
-          <p:nvPr/>
-        </p:nvSpPr>
-        <p:spPr bwMode="auto">
-          <a:xfrm>
-            <a:off x="846992" y="2576463"/>
-            <a:ext cx="9325708" cy="1231106"/>
-          </a:xfrm>
-          <a:prstGeom prst="rect">
-            <a:avLst/>
-          </a:prstGeom>
-          <a:noFill/>
-          <a:ln>
-            <a:noFill/>
-          </a:ln>
-          <a:effectLst/>
-          <a:extLst>
-            <a:ext uri="{909E8E84-426E-40DD-AFC4-6F175D3DCCD1}">
-              <a14:hiddenFill xmlns:a14="http://schemas.microsoft.com/office/drawing/2010/main">
-                <a:solidFill>
-                  <a:schemeClr val="accent1"/>
-                </a:solidFill>
-              </a14:hiddenFill>
-            </a:ext>
-            <a:ext uri="{91240B29-F687-4F45-9708-019B960494DF}">
-              <a14:hiddenLine xmlns:a14="http://schemas.microsoft.com/office/drawing/2010/main" w="9525">
-                <a:solidFill>
-                  <a:schemeClr val="tx1"/>
-                </a:solidFill>
-                <a:miter lim="800000"/>
-                <a:headEnd/>
-                <a:tailEnd/>
-              </a14:hiddenLine>
-            </a:ext>
-            <a:ext uri="{AF507438-7753-43E0-B8FC-AC1667EBCBE1}">
-              <a14:hiddenEffects xmlns:a14="http://schemas.microsoft.com/office/drawing/2010/main">
-                <a:effectLst>
-                  <a:outerShdw dist="35921" dir="2700000" algn="ctr" rotWithShape="0">
-                    <a:schemeClr val="bg2"/>
-                  </a:outerShdw>
-                </a:effectLst>
-              </a14:hiddenEffects>
-            </a:ext>
-          </a:extLst>
-        </p:spPr>
-        <p:txBody>
-          <a:bodyPr vert="horz" wrap="square" lIns="0" tIns="0" rIns="0" bIns="0" numCol="1" anchor="ctr" anchorCtr="0" compatLnSpc="1">
-            <a:prstTxWarp prst="textNoShape">
-              <a:avLst/>
-            </a:prstTxWarp>
-            <a:spAutoFit/>
-          </a:bodyPr>
-          <a:lstStyle/>
-          <a:p>
-            <a:r>
-              <a:rPr lang="de-DE" sz="1600" dirty="0">
-                <a:solidFill>
-                  <a:srgbClr val="0000FF"/>
-                </a:solidFill>
-                <a:latin typeface="Consolas" panose="020B0609020204030204" pitchFamily="49" charset="0"/>
-              </a:rPr>
-              <a:t>&lt;</a:t>
-            </a:r>
-            <a:r>
-              <a:rPr lang="de-DE" sz="1600" dirty="0" err="1">
-                <a:solidFill>
-                  <a:srgbClr val="A31515"/>
-                </a:solidFill>
-                <a:latin typeface="Consolas" panose="020B0609020204030204" pitchFamily="49" charset="0"/>
-              </a:rPr>
-              <a:t>system.web</a:t>
-            </a:r>
-            <a:r>
-              <a:rPr lang="de-DE" sz="1600" dirty="0">
-                <a:solidFill>
-                  <a:srgbClr val="0000FF"/>
-                </a:solidFill>
-                <a:latin typeface="Consolas" panose="020B0609020204030204" pitchFamily="49" charset="0"/>
-              </a:rPr>
-              <a:t>&gt;</a:t>
-            </a:r>
-          </a:p>
-          <a:p>
-            <a:endParaRPr lang="de-DE" sz="1600" dirty="0">
-              <a:solidFill>
-                <a:srgbClr val="000000"/>
-              </a:solidFill>
-              <a:latin typeface="Consolas" panose="020B0609020204030204" pitchFamily="49" charset="0"/>
-            </a:endParaRPr>
-          </a:p>
-          <a:p>
-            <a:pPr lvl="1"/>
-            <a:r>
-              <a:rPr lang="de-DE" sz="1600" dirty="0">
-                <a:solidFill>
-                  <a:srgbClr val="0000FF"/>
-                </a:solidFill>
-                <a:latin typeface="Consolas" panose="020B0609020204030204" pitchFamily="49" charset="0"/>
-              </a:rPr>
-              <a:t>&lt;!--</a:t>
-            </a:r>
-            <a:r>
-              <a:rPr lang="de-DE" sz="1600" dirty="0">
-                <a:solidFill>
-                  <a:srgbClr val="008000"/>
-                </a:solidFill>
-                <a:latin typeface="Consolas" panose="020B0609020204030204" pitchFamily="49" charset="0"/>
-              </a:rPr>
-              <a:t>Modus Forms und </a:t>
-            </a:r>
-            <a:r>
-              <a:rPr lang="de-DE" sz="1600" dirty="0" err="1">
-                <a:solidFill>
-                  <a:srgbClr val="008000"/>
-                </a:solidFill>
-                <a:latin typeface="Consolas" panose="020B0609020204030204" pitchFamily="49" charset="0"/>
-              </a:rPr>
-              <a:t>Formauthentifikation</a:t>
-            </a:r>
-            <a:r>
-              <a:rPr lang="de-DE" sz="1600" dirty="0">
-                <a:solidFill>
-                  <a:srgbClr val="008000"/>
-                </a:solidFill>
-                <a:latin typeface="Consolas" panose="020B0609020204030204" pitchFamily="49" charset="0"/>
-              </a:rPr>
-              <a:t> erlauben</a:t>
-            </a:r>
-            <a:r>
-              <a:rPr lang="de-DE" sz="1600" dirty="0">
-                <a:solidFill>
-                  <a:srgbClr val="0000FF"/>
-                </a:solidFill>
-                <a:latin typeface="Consolas" panose="020B0609020204030204" pitchFamily="49" charset="0"/>
-              </a:rPr>
-              <a:t>--&gt; </a:t>
-            </a:r>
-            <a:endParaRPr lang="de-DE" sz="1600" dirty="0">
-              <a:solidFill>
-                <a:srgbClr val="000000"/>
-              </a:solidFill>
-              <a:latin typeface="Consolas" panose="020B0609020204030204" pitchFamily="49" charset="0"/>
-            </a:endParaRPr>
-          </a:p>
-          <a:p>
-            <a:pPr lvl="1"/>
-            <a:r>
-              <a:rPr lang="de-DE" sz="1600" dirty="0">
-                <a:solidFill>
-                  <a:srgbClr val="0000FF"/>
-                </a:solidFill>
-                <a:latin typeface="Consolas" panose="020B0609020204030204" pitchFamily="49" charset="0"/>
-              </a:rPr>
-              <a:t>&lt;</a:t>
-            </a:r>
-            <a:r>
-              <a:rPr lang="de-DE" sz="1600" dirty="0" err="1">
-                <a:solidFill>
-                  <a:srgbClr val="A31515"/>
-                </a:solidFill>
-                <a:latin typeface="Consolas" panose="020B0609020204030204" pitchFamily="49" charset="0"/>
-              </a:rPr>
-              <a:t>authentication</a:t>
-            </a:r>
-            <a:r>
-              <a:rPr lang="de-DE" sz="1600" dirty="0">
-                <a:solidFill>
-                  <a:srgbClr val="0000FF"/>
-                </a:solidFill>
-                <a:latin typeface="Consolas" panose="020B0609020204030204" pitchFamily="49" charset="0"/>
-              </a:rPr>
-              <a:t> </a:t>
-            </a:r>
-            <a:r>
-              <a:rPr lang="de-DE" sz="1600" dirty="0" err="1">
-                <a:solidFill>
-                  <a:srgbClr val="FF0000"/>
-                </a:solidFill>
-                <a:latin typeface="Consolas" panose="020B0609020204030204" pitchFamily="49" charset="0"/>
-              </a:rPr>
-              <a:t>mode</a:t>
-            </a:r>
-            <a:r>
-              <a:rPr lang="de-DE" sz="1600" dirty="0">
-                <a:solidFill>
-                  <a:srgbClr val="0000FF"/>
-                </a:solidFill>
-                <a:latin typeface="Consolas" panose="020B0609020204030204" pitchFamily="49" charset="0"/>
-              </a:rPr>
-              <a:t>="Forms"/&gt;</a:t>
-            </a:r>
-            <a:endParaRPr lang="de-DE" sz="1600" dirty="0">
-              <a:solidFill>
-                <a:srgbClr val="000000"/>
-              </a:solidFill>
-              <a:latin typeface="Consolas" panose="020B0609020204030204" pitchFamily="49" charset="0"/>
-            </a:endParaRPr>
-          </a:p>
-          <a:p>
-            <a:r>
-              <a:rPr lang="de-DE" sz="1600" dirty="0">
-                <a:solidFill>
-                  <a:srgbClr val="0000FF"/>
-                </a:solidFill>
-                <a:latin typeface="Consolas" panose="020B0609020204030204" pitchFamily="49" charset="0"/>
-              </a:rPr>
-              <a:t>&lt;/</a:t>
-            </a:r>
-            <a:r>
-              <a:rPr lang="de-DE" sz="1600" dirty="0" err="1">
-                <a:solidFill>
-                  <a:srgbClr val="A31515"/>
-                </a:solidFill>
-                <a:latin typeface="Consolas" panose="020B0609020204030204" pitchFamily="49" charset="0"/>
-              </a:rPr>
-              <a:t>system.web</a:t>
-            </a:r>
-            <a:r>
-              <a:rPr lang="de-DE" sz="1600" dirty="0">
-                <a:solidFill>
-                  <a:srgbClr val="0000FF"/>
-                </a:solidFill>
-                <a:latin typeface="Consolas" panose="020B0609020204030204" pitchFamily="49" charset="0"/>
-              </a:rPr>
-              <a:t>&gt;</a:t>
-            </a:r>
-            <a:endParaRPr kumimoji="0" lang="de-DE" altLang="de-DE" sz="1600" b="0" i="0" u="none" strike="noStrike" cap="none" normalizeH="0" baseline="0" dirty="0">
-              <a:ln>
-                <a:noFill/>
-              </a:ln>
-              <a:solidFill>
-                <a:schemeClr val="tx1"/>
-              </a:solidFill>
-              <a:effectLst/>
-              <a:latin typeface="Consolas" panose="020B0609020204030204" pitchFamily="49" charset="0"/>
-            </a:endParaRPr>
-          </a:p>
-        </p:txBody>
-      </p:sp>
-      <p:sp>
-        <p:nvSpPr>
-          <p:cNvPr id="7" name="Textfeld 6"/>
-          <p:cNvSpPr txBox="1"/>
-          <p:nvPr/>
-        </p:nvSpPr>
-        <p:spPr>
-          <a:xfrm>
-            <a:off x="846992" y="1902743"/>
-            <a:ext cx="4859215" cy="461665"/>
-          </a:xfrm>
-          <a:prstGeom prst="rect">
-            <a:avLst/>
-          </a:prstGeom>
-          <a:noFill/>
-        </p:spPr>
-        <p:txBody>
-          <a:bodyPr wrap="square" rtlCol="0">
-            <a:spAutoFit/>
-          </a:bodyPr>
-          <a:lstStyle/>
-          <a:p>
-            <a:r>
-              <a:rPr lang="de-DE" sz="2400" dirty="0" err="1">
-                <a:latin typeface="Century Gothic" panose="020B0502020202020204" pitchFamily="34" charset="0"/>
-              </a:rPr>
-              <a:t>web.config</a:t>
-            </a:r>
-            <a:endParaRPr lang="de-DE" sz="2400" dirty="0">
-              <a:latin typeface="Century Gothic" panose="020B0502020202020204" pitchFamily="34" charset="0"/>
-            </a:endParaRPr>
-          </a:p>
-        </p:txBody>
-      </p:sp>
-    </p:spTree>
-    <p:extLst>
-      <p:ext uri="{BB962C8B-B14F-4D97-AF65-F5344CB8AC3E}">
-        <p14:creationId xmlns:p14="http://schemas.microsoft.com/office/powerpoint/2010/main" val="3555879107"/>
+        <p14:creationId xmlns:p14="http://schemas.microsoft.com/office/powerpoint/2010/main" val="2046820762"/>
       </p:ext>
     </p:extLst>
   </p:cSld>
@@ -13450,1144 +12932,6 @@
 </file>
 
 <file path=ppt/slides/slide15.xml><?xml version="1.0" encoding="utf-8"?>
-<p:sld xmlns:a="http://schemas.openxmlformats.org/drawingml/2006/main" xmlns:r="http://schemas.openxmlformats.org/officeDocument/2006/relationships" xmlns:p="http://schemas.openxmlformats.org/presentationml/2006/main">
-  <p:cSld>
-    <p:spTree>
-      <p:nvGrpSpPr>
-        <p:cNvPr id="1" name=""/>
-        <p:cNvGrpSpPr/>
-        <p:nvPr/>
-      </p:nvGrpSpPr>
-      <p:grpSpPr>
-        <a:xfrm>
-          <a:off x="0" y="0"/>
-          <a:ext cx="0" cy="0"/>
-          <a:chOff x="0" y="0"/>
-          <a:chExt cx="0" cy="0"/>
-        </a:xfrm>
-      </p:grpSpPr>
-      <p:sp>
-        <p:nvSpPr>
-          <p:cNvPr id="1029" name="Rectangle 2"/>
-          <p:cNvSpPr>
-            <a:spLocks noGrp="1" noChangeArrowheads="1"/>
-          </p:cNvSpPr>
-          <p:nvPr>
-            <p:ph type="title" idx="4294967295"/>
-          </p:nvPr>
-        </p:nvSpPr>
-        <p:spPr/>
-        <p:txBody>
-          <a:bodyPr>
-            <a:normAutofit/>
-          </a:bodyPr>
-          <a:lstStyle/>
-          <a:p>
-            <a:r>
-              <a:rPr lang="en-US" altLang="de-DE" sz="5400" dirty="0">
-                <a:solidFill>
-                  <a:schemeClr val="bg1">
-                    <a:lumMod val="65000"/>
-                  </a:schemeClr>
-                </a:solidFill>
-                <a:latin typeface="Century Gothic" panose="020B0502020202020204" pitchFamily="34" charset="0"/>
-                <a:ea typeface="+mn-ea"/>
-                <a:cs typeface="+mn-cs"/>
-              </a:rPr>
-              <a:t>Form </a:t>
-            </a:r>
-            <a:r>
-              <a:rPr lang="en-US" altLang="de-DE" sz="5400" dirty="0" err="1">
-                <a:solidFill>
-                  <a:schemeClr val="bg1">
-                    <a:lumMod val="65000"/>
-                  </a:schemeClr>
-                </a:solidFill>
-                <a:latin typeface="Century Gothic" panose="020B0502020202020204" pitchFamily="34" charset="0"/>
-                <a:ea typeface="+mn-ea"/>
-                <a:cs typeface="+mn-cs"/>
-              </a:rPr>
-              <a:t>Authentifikation</a:t>
-            </a:r>
-            <a:endParaRPr lang="en-US" altLang="de-DE" sz="5400" dirty="0">
-              <a:solidFill>
-                <a:schemeClr val="bg1">
-                  <a:lumMod val="65000"/>
-                </a:schemeClr>
-              </a:solidFill>
-              <a:latin typeface="Century Gothic" panose="020B0502020202020204" pitchFamily="34" charset="0"/>
-              <a:ea typeface="+mn-ea"/>
-              <a:cs typeface="+mn-cs"/>
-            </a:endParaRPr>
-          </a:p>
-        </p:txBody>
-      </p:sp>
-      <p:sp>
-        <p:nvSpPr>
-          <p:cNvPr id="6" name="Rechteck 5"/>
-          <p:cNvSpPr/>
-          <p:nvPr/>
-        </p:nvSpPr>
-        <p:spPr>
-          <a:xfrm>
-            <a:off x="838199" y="2295695"/>
-            <a:ext cx="9413631" cy="2800767"/>
-          </a:xfrm>
-          <a:prstGeom prst="rect">
-            <a:avLst/>
-          </a:prstGeom>
-        </p:spPr>
-        <p:txBody>
-          <a:bodyPr wrap="square">
-            <a:spAutoFit/>
-          </a:bodyPr>
-          <a:lstStyle/>
-          <a:p>
-            <a:r>
-              <a:rPr lang="en-US" sz="1600" dirty="0">
-                <a:solidFill>
-                  <a:srgbClr val="0000FF"/>
-                </a:solidFill>
-                <a:latin typeface="Consolas" panose="020B0609020204030204" pitchFamily="49" charset="0"/>
-              </a:rPr>
-              <a:t>void</a:t>
-            </a:r>
-            <a:r>
-              <a:rPr lang="en-US" sz="1600" dirty="0">
-                <a:solidFill>
-                  <a:srgbClr val="000000"/>
-                </a:solidFill>
-                <a:latin typeface="Consolas" panose="020B0609020204030204" pitchFamily="49" charset="0"/>
-              </a:rPr>
-              <a:t> </a:t>
-            </a:r>
-            <a:r>
-              <a:rPr lang="en-US" sz="1600" dirty="0" err="1">
-                <a:solidFill>
-                  <a:srgbClr val="000000"/>
-                </a:solidFill>
-                <a:latin typeface="Consolas" panose="020B0609020204030204" pitchFamily="49" charset="0"/>
-              </a:rPr>
-              <a:t>Logon_Click</a:t>
-            </a:r>
-            <a:r>
-              <a:rPr lang="en-US" sz="1600" dirty="0">
-                <a:solidFill>
-                  <a:srgbClr val="000000"/>
-                </a:solidFill>
-                <a:latin typeface="Consolas" panose="020B0609020204030204" pitchFamily="49" charset="0"/>
-              </a:rPr>
-              <a:t>(</a:t>
-            </a:r>
-            <a:r>
-              <a:rPr lang="en-US" sz="1600" dirty="0">
-                <a:solidFill>
-                  <a:srgbClr val="0000FF"/>
-                </a:solidFill>
-                <a:latin typeface="Consolas" panose="020B0609020204030204" pitchFamily="49" charset="0"/>
-              </a:rPr>
-              <a:t>object</a:t>
-            </a:r>
-            <a:r>
-              <a:rPr lang="en-US" sz="1600" dirty="0">
-                <a:solidFill>
-                  <a:srgbClr val="000000"/>
-                </a:solidFill>
-                <a:latin typeface="Consolas" panose="020B0609020204030204" pitchFamily="49" charset="0"/>
-              </a:rPr>
-              <a:t> sender, </a:t>
-            </a:r>
-            <a:r>
-              <a:rPr lang="en-US" sz="1600" dirty="0" err="1">
-                <a:solidFill>
-                  <a:srgbClr val="2B91AF"/>
-                </a:solidFill>
-                <a:latin typeface="Consolas" panose="020B0609020204030204" pitchFamily="49" charset="0"/>
-              </a:rPr>
-              <a:t>EventArgs</a:t>
-            </a:r>
-            <a:r>
-              <a:rPr lang="en-US" sz="1600" dirty="0">
-                <a:solidFill>
-                  <a:srgbClr val="000000"/>
-                </a:solidFill>
-                <a:latin typeface="Consolas" panose="020B0609020204030204" pitchFamily="49" charset="0"/>
-              </a:rPr>
-              <a:t> e)</a:t>
-            </a:r>
-          </a:p>
-          <a:p>
-            <a:r>
-              <a:rPr lang="de-DE" sz="1600" dirty="0">
-                <a:solidFill>
-                  <a:srgbClr val="000000"/>
-                </a:solidFill>
-                <a:latin typeface="Consolas" panose="020B0609020204030204" pitchFamily="49" charset="0"/>
-              </a:rPr>
-              <a:t>{</a:t>
-            </a:r>
-          </a:p>
-          <a:p>
-            <a:r>
-              <a:rPr lang="de-DE" sz="1600" dirty="0">
-                <a:solidFill>
-                  <a:srgbClr val="000000"/>
-                </a:solidFill>
-                <a:latin typeface="Consolas" panose="020B0609020204030204" pitchFamily="49" charset="0"/>
-              </a:rPr>
-              <a:t>    </a:t>
-            </a:r>
-            <a:r>
-              <a:rPr lang="de-DE" sz="1600" dirty="0" err="1">
-                <a:solidFill>
-                  <a:srgbClr val="0000FF"/>
-                </a:solidFill>
-                <a:latin typeface="Consolas" panose="020B0609020204030204" pitchFamily="49" charset="0"/>
-              </a:rPr>
-              <a:t>if</a:t>
-            </a:r>
-            <a:r>
-              <a:rPr lang="de-DE" sz="1600" dirty="0">
-                <a:solidFill>
-                  <a:srgbClr val="000000"/>
-                </a:solidFill>
-                <a:latin typeface="Consolas" panose="020B0609020204030204" pitchFamily="49" charset="0"/>
-              </a:rPr>
-              <a:t> ((</a:t>
-            </a:r>
-            <a:r>
-              <a:rPr lang="de-DE" sz="1600" dirty="0" err="1">
-                <a:solidFill>
-                  <a:srgbClr val="000000"/>
-                </a:solidFill>
-                <a:latin typeface="Consolas" panose="020B0609020204030204" pitchFamily="49" charset="0"/>
-              </a:rPr>
-              <a:t>UserEmail.Text</a:t>
-            </a:r>
-            <a:r>
-              <a:rPr lang="de-DE" sz="1600" dirty="0">
-                <a:solidFill>
-                  <a:srgbClr val="000000"/>
-                </a:solidFill>
-                <a:latin typeface="Consolas" panose="020B0609020204030204" pitchFamily="49" charset="0"/>
-              </a:rPr>
-              <a:t> == </a:t>
-            </a:r>
-            <a:r>
-              <a:rPr lang="de-DE" sz="1600" dirty="0">
-                <a:solidFill>
-                  <a:srgbClr val="A31515"/>
-                </a:solidFill>
-                <a:latin typeface="Consolas" panose="020B0609020204030204" pitchFamily="49" charset="0"/>
-              </a:rPr>
-              <a:t>"jchen@contoso.com"</a:t>
-            </a:r>
-            <a:r>
-              <a:rPr lang="de-DE" sz="1600" dirty="0">
-                <a:solidFill>
-                  <a:srgbClr val="000000"/>
-                </a:solidFill>
-                <a:latin typeface="Consolas" panose="020B0609020204030204" pitchFamily="49" charset="0"/>
-              </a:rPr>
-              <a:t>) &amp;&amp; (</a:t>
-            </a:r>
-            <a:r>
-              <a:rPr lang="de-DE" sz="1600" dirty="0" err="1">
-                <a:solidFill>
-                  <a:srgbClr val="000000"/>
-                </a:solidFill>
-                <a:latin typeface="Consolas" panose="020B0609020204030204" pitchFamily="49" charset="0"/>
-              </a:rPr>
-              <a:t>UserPass.Text</a:t>
-            </a:r>
-            <a:r>
-              <a:rPr lang="de-DE" sz="1600" dirty="0">
-                <a:solidFill>
-                  <a:srgbClr val="000000"/>
-                </a:solidFill>
-                <a:latin typeface="Consolas" panose="020B0609020204030204" pitchFamily="49" charset="0"/>
-              </a:rPr>
-              <a:t> == </a:t>
-            </a:r>
-            <a:r>
-              <a:rPr lang="de-DE" sz="1600" dirty="0">
-                <a:solidFill>
-                  <a:srgbClr val="A31515"/>
-                </a:solidFill>
-                <a:latin typeface="Consolas" panose="020B0609020204030204" pitchFamily="49" charset="0"/>
-              </a:rPr>
-              <a:t>"37Yj*99Ps"</a:t>
-            </a:r>
-            <a:r>
-              <a:rPr lang="de-DE" sz="1600" dirty="0">
-                <a:solidFill>
-                  <a:srgbClr val="000000"/>
-                </a:solidFill>
-                <a:latin typeface="Consolas" panose="020B0609020204030204" pitchFamily="49" charset="0"/>
-              </a:rPr>
-              <a:t>))</a:t>
-            </a:r>
-          </a:p>
-          <a:p>
-            <a:r>
-              <a:rPr lang="de-DE" sz="1600" dirty="0">
-                <a:solidFill>
-                  <a:srgbClr val="000000"/>
-                </a:solidFill>
-                <a:latin typeface="Consolas" panose="020B0609020204030204" pitchFamily="49" charset="0"/>
-              </a:rPr>
-              <a:t>    {</a:t>
-            </a:r>
-          </a:p>
-          <a:p>
-            <a:pPr lvl="0"/>
-            <a:r>
-              <a:rPr lang="de-DE" sz="1600" dirty="0">
-                <a:solidFill>
-                  <a:srgbClr val="000000"/>
-                </a:solidFill>
-                <a:latin typeface="Consolas" panose="020B0609020204030204" pitchFamily="49" charset="0"/>
-              </a:rPr>
-              <a:t> 	</a:t>
-            </a:r>
-            <a:r>
-              <a:rPr lang="de-DE" altLang="de-DE" sz="1600" dirty="0" err="1">
-                <a:solidFill>
-                  <a:srgbClr val="0000FF"/>
-                </a:solidFill>
-                <a:latin typeface="Consolas" panose="020B0609020204030204" pitchFamily="49" charset="0"/>
-              </a:rPr>
-              <a:t>Authentication.RedirectFromLoginPage</a:t>
-            </a:r>
-            <a:r>
-              <a:rPr lang="de-DE" altLang="de-DE" sz="1600" dirty="0">
-                <a:latin typeface="Consolas" panose="020B0609020204030204" pitchFamily="49" charset="0"/>
-              </a:rPr>
-              <a:t>(</a:t>
-            </a:r>
-            <a:r>
-              <a:rPr lang="de-DE" sz="1600" dirty="0" err="1">
-                <a:latin typeface="Consolas" panose="020B0609020204030204" pitchFamily="49" charset="0"/>
-              </a:rPr>
-              <a:t>UserEmail</a:t>
-            </a:r>
-            <a:r>
-              <a:rPr lang="de-DE" altLang="de-DE" sz="1600" dirty="0" err="1">
-                <a:latin typeface="Consolas" panose="020B0609020204030204" pitchFamily="49" charset="0"/>
-              </a:rPr>
-              <a:t>.Value</a:t>
-            </a:r>
-            <a:r>
-              <a:rPr lang="de-DE" altLang="de-DE" sz="1600" dirty="0">
-                <a:latin typeface="Consolas" panose="020B0609020204030204" pitchFamily="49" charset="0"/>
-              </a:rPr>
-              <a:t>, </a:t>
-            </a:r>
-            <a:r>
-              <a:rPr lang="de-DE" sz="1600" dirty="0" err="1">
-                <a:latin typeface="Consolas" panose="020B0609020204030204" pitchFamily="49" charset="0"/>
-              </a:rPr>
-              <a:t>Persist</a:t>
-            </a:r>
-            <a:r>
-              <a:rPr lang="de-DE" altLang="de-DE" sz="1600" dirty="0" err="1">
-                <a:latin typeface="Consolas" panose="020B0609020204030204" pitchFamily="49" charset="0"/>
-              </a:rPr>
-              <a:t>.Checked</a:t>
-            </a:r>
-            <a:r>
-              <a:rPr lang="de-DE" altLang="de-DE" sz="1600" dirty="0">
-                <a:solidFill>
-                  <a:srgbClr val="000000"/>
-                </a:solidFill>
-                <a:latin typeface="Consolas" panose="020B0609020204030204" pitchFamily="49" charset="0"/>
-              </a:rPr>
-              <a:t>);</a:t>
-            </a:r>
-            <a:r>
-              <a:rPr lang="de-DE" altLang="de-DE" sz="1200" dirty="0">
-                <a:latin typeface="Consolas" panose="020B0609020204030204" pitchFamily="49" charset="0"/>
-              </a:rPr>
-              <a:t> </a:t>
-            </a:r>
-            <a:endParaRPr lang="de-DE" sz="1600" dirty="0">
-              <a:solidFill>
-                <a:srgbClr val="000000"/>
-              </a:solidFill>
-              <a:latin typeface="Consolas" panose="020B0609020204030204" pitchFamily="49" charset="0"/>
-            </a:endParaRPr>
-          </a:p>
-          <a:p>
-            <a:r>
-              <a:rPr lang="de-DE" sz="1600" dirty="0">
-                <a:solidFill>
-                  <a:srgbClr val="000000"/>
-                </a:solidFill>
-                <a:latin typeface="Consolas" panose="020B0609020204030204" pitchFamily="49" charset="0"/>
-              </a:rPr>
-              <a:t>    }</a:t>
-            </a:r>
-          </a:p>
-          <a:p>
-            <a:r>
-              <a:rPr lang="de-DE" sz="1600" dirty="0">
-                <a:solidFill>
-                  <a:srgbClr val="000000"/>
-                </a:solidFill>
-                <a:latin typeface="Consolas" panose="020B0609020204030204" pitchFamily="49" charset="0"/>
-              </a:rPr>
-              <a:t>    </a:t>
-            </a:r>
-            <a:r>
-              <a:rPr lang="de-DE" sz="1600" dirty="0" err="1">
-                <a:solidFill>
-                  <a:srgbClr val="0000FF"/>
-                </a:solidFill>
-                <a:latin typeface="Consolas" panose="020B0609020204030204" pitchFamily="49" charset="0"/>
-              </a:rPr>
-              <a:t>else</a:t>
-            </a:r>
-            <a:endParaRPr lang="de-DE" sz="1600" dirty="0">
-              <a:solidFill>
-                <a:srgbClr val="000000"/>
-              </a:solidFill>
-              <a:latin typeface="Consolas" panose="020B0609020204030204" pitchFamily="49" charset="0"/>
-            </a:endParaRPr>
-          </a:p>
-          <a:p>
-            <a:r>
-              <a:rPr lang="de-DE" sz="1600" dirty="0">
-                <a:solidFill>
-                  <a:srgbClr val="000000"/>
-                </a:solidFill>
-                <a:latin typeface="Consolas" panose="020B0609020204030204" pitchFamily="49" charset="0"/>
-              </a:rPr>
-              <a:t>    {</a:t>
-            </a:r>
-          </a:p>
-          <a:p>
-            <a:r>
-              <a:rPr lang="en-US" sz="1600" dirty="0">
-                <a:solidFill>
-                  <a:srgbClr val="000000"/>
-                </a:solidFill>
-                <a:latin typeface="Consolas" panose="020B0609020204030204" pitchFamily="49" charset="0"/>
-              </a:rPr>
-              <a:t>        </a:t>
-            </a:r>
-            <a:r>
-              <a:rPr lang="en-US" sz="1600" dirty="0">
-                <a:solidFill>
-                  <a:srgbClr val="008000"/>
-                </a:solidFill>
-                <a:latin typeface="Consolas" panose="020B0609020204030204" pitchFamily="49" charset="0"/>
-              </a:rPr>
-              <a:t>//</a:t>
-            </a:r>
-            <a:r>
-              <a:rPr lang="en-US" sz="1600" dirty="0" err="1">
-                <a:solidFill>
-                  <a:srgbClr val="008000"/>
-                </a:solidFill>
-                <a:latin typeface="Consolas" panose="020B0609020204030204" pitchFamily="49" charset="0"/>
-              </a:rPr>
-              <a:t>Errormessage</a:t>
-            </a:r>
-            <a:endParaRPr lang="en-US" sz="1600" dirty="0">
-              <a:solidFill>
-                <a:srgbClr val="008000"/>
-              </a:solidFill>
-              <a:latin typeface="Consolas" panose="020B0609020204030204" pitchFamily="49" charset="0"/>
-            </a:endParaRPr>
-          </a:p>
-          <a:p>
-            <a:r>
-              <a:rPr lang="de-DE" sz="1600" dirty="0">
-                <a:solidFill>
-                  <a:srgbClr val="000000"/>
-                </a:solidFill>
-                <a:latin typeface="Consolas" panose="020B0609020204030204" pitchFamily="49" charset="0"/>
-              </a:rPr>
-              <a:t>    }</a:t>
-            </a:r>
-          </a:p>
-          <a:p>
-            <a:r>
-              <a:rPr lang="de-DE" sz="1600" dirty="0">
-                <a:solidFill>
-                  <a:srgbClr val="000000"/>
-                </a:solidFill>
-                <a:latin typeface="Consolas" panose="020B0609020204030204" pitchFamily="49" charset="0"/>
-              </a:rPr>
-              <a:t>}</a:t>
-            </a:r>
-            <a:endParaRPr lang="de-DE" sz="1600" dirty="0"/>
-          </a:p>
-        </p:txBody>
-      </p:sp>
-      <p:grpSp>
-        <p:nvGrpSpPr>
-          <p:cNvPr id="48" name="Gruppieren 47"/>
-          <p:cNvGrpSpPr/>
-          <p:nvPr/>
-        </p:nvGrpSpPr>
-        <p:grpSpPr>
-          <a:xfrm>
-            <a:off x="9077376" y="3906505"/>
-            <a:ext cx="1362024" cy="1794964"/>
-            <a:chOff x="1198059" y="2402237"/>
-            <a:chExt cx="1045029" cy="1574435"/>
-          </a:xfrm>
-          <a:solidFill>
-            <a:schemeClr val="bg1"/>
-          </a:solidFill>
-        </p:grpSpPr>
-        <p:grpSp>
-          <p:nvGrpSpPr>
-            <p:cNvPr id="49" name="Gruppieren 48"/>
-            <p:cNvGrpSpPr/>
-            <p:nvPr/>
-          </p:nvGrpSpPr>
-          <p:grpSpPr>
-            <a:xfrm>
-              <a:off x="1198059" y="2402237"/>
-              <a:ext cx="1045029" cy="1574435"/>
-              <a:chOff x="1125685" y="3886200"/>
-              <a:chExt cx="1045029" cy="1574435"/>
-            </a:xfrm>
-            <a:grpFill/>
-          </p:grpSpPr>
-          <p:sp>
-            <p:nvSpPr>
-              <p:cNvPr id="51" name="Rechteck 50"/>
-              <p:cNvSpPr/>
-              <p:nvPr/>
-            </p:nvSpPr>
-            <p:spPr>
-              <a:xfrm>
-                <a:off x="1125685" y="4590087"/>
-                <a:ext cx="1045029" cy="870548"/>
-              </a:xfrm>
-              <a:prstGeom prst="rect">
-                <a:avLst/>
-              </a:prstGeom>
-              <a:grpFill/>
-              <a:ln w="120650">
-                <a:solidFill>
-                  <a:schemeClr val="tx1"/>
-                </a:solidFill>
-              </a:ln>
-            </p:spPr>
-            <p:style>
-              <a:lnRef idx="2">
-                <a:schemeClr val="accent1">
-                  <a:shade val="50000"/>
-                </a:schemeClr>
-              </a:lnRef>
-              <a:fillRef idx="1">
-                <a:schemeClr val="accent1"/>
-              </a:fillRef>
-              <a:effectRef idx="0">
-                <a:schemeClr val="accent1"/>
-              </a:effectRef>
-              <a:fontRef idx="minor">
-                <a:schemeClr val="lt1"/>
-              </a:fontRef>
-            </p:style>
-            <p:txBody>
-              <a:bodyPr rtlCol="0" anchor="ctr"/>
-              <a:lstStyle/>
-              <a:p>
-                <a:pPr algn="ctr"/>
-                <a:endParaRPr lang="de-DE"/>
-              </a:p>
-            </p:txBody>
-          </p:sp>
-          <p:sp>
-            <p:nvSpPr>
-              <p:cNvPr id="52" name="Flussdiagramm: Verzögerung 51"/>
-              <p:cNvSpPr/>
-              <p:nvPr/>
-            </p:nvSpPr>
-            <p:spPr>
-              <a:xfrm rot="16200000">
-                <a:off x="1296256" y="3866670"/>
-                <a:ext cx="703887" cy="742948"/>
-              </a:xfrm>
-              <a:prstGeom prst="flowChartDelay">
-                <a:avLst/>
-              </a:prstGeom>
-              <a:grpFill/>
-              <a:ln w="120650">
-                <a:solidFill>
-                  <a:schemeClr val="tx1"/>
-                </a:solidFill>
-              </a:ln>
-            </p:spPr>
-            <p:style>
-              <a:lnRef idx="2">
-                <a:schemeClr val="accent1">
-                  <a:shade val="50000"/>
-                </a:schemeClr>
-              </a:lnRef>
-              <a:fillRef idx="1">
-                <a:schemeClr val="accent1"/>
-              </a:fillRef>
-              <a:effectRef idx="0">
-                <a:schemeClr val="accent1"/>
-              </a:effectRef>
-              <a:fontRef idx="minor">
-                <a:schemeClr val="lt1"/>
-              </a:fontRef>
-            </p:style>
-            <p:txBody>
-              <a:bodyPr rtlCol="0" anchor="ctr"/>
-              <a:lstStyle/>
-              <a:p>
-                <a:pPr algn="ctr"/>
-                <a:endParaRPr lang="de-DE"/>
-              </a:p>
-            </p:txBody>
-          </p:sp>
-        </p:grpSp>
-        <p:sp>
-          <p:nvSpPr>
-            <p:cNvPr id="50" name="Rechteck 49"/>
-            <p:cNvSpPr/>
-            <p:nvPr/>
-          </p:nvSpPr>
-          <p:spPr>
-            <a:xfrm>
-              <a:off x="1933575" y="2719592"/>
-              <a:ext cx="309513" cy="325901"/>
-            </a:xfrm>
-            <a:prstGeom prst="rect">
-              <a:avLst/>
-            </a:prstGeom>
-            <a:grpFill/>
-            <a:ln>
-              <a:solidFill>
-                <a:schemeClr val="bg1"/>
-              </a:solidFill>
-            </a:ln>
-          </p:spPr>
-          <p:style>
-            <a:lnRef idx="2">
-              <a:schemeClr val="accent1">
-                <a:shade val="50000"/>
-              </a:schemeClr>
-            </a:lnRef>
-            <a:fillRef idx="1">
-              <a:schemeClr val="accent1"/>
-            </a:fillRef>
-            <a:effectRef idx="0">
-              <a:schemeClr val="accent1"/>
-            </a:effectRef>
-            <a:fontRef idx="minor">
-              <a:schemeClr val="lt1"/>
-            </a:fontRef>
-          </p:style>
-          <p:txBody>
-            <a:bodyPr rtlCol="0" anchor="ctr"/>
-            <a:lstStyle/>
-            <a:p>
-              <a:pPr algn="ctr"/>
-              <a:endParaRPr lang="de-DE"/>
-            </a:p>
-          </p:txBody>
-        </p:sp>
-      </p:grpSp>
-      <p:grpSp>
-        <p:nvGrpSpPr>
-          <p:cNvPr id="53" name="Gruppieren 52"/>
-          <p:cNvGrpSpPr/>
-          <p:nvPr/>
-        </p:nvGrpSpPr>
-        <p:grpSpPr>
-          <a:xfrm>
-            <a:off x="9758388" y="4961573"/>
-            <a:ext cx="847515" cy="1358223"/>
-            <a:chOff x="5039801" y="4080592"/>
-            <a:chExt cx="1341120" cy="2078655"/>
-          </a:xfrm>
-        </p:grpSpPr>
-        <p:grpSp>
-          <p:nvGrpSpPr>
-            <p:cNvPr id="54" name="Gruppieren 53"/>
-            <p:cNvGrpSpPr/>
-            <p:nvPr/>
-          </p:nvGrpSpPr>
-          <p:grpSpPr>
-            <a:xfrm>
-              <a:off x="5039801" y="4294971"/>
-              <a:ext cx="1341120" cy="1726709"/>
-              <a:chOff x="5039801" y="4294971"/>
-              <a:chExt cx="1341120" cy="1726709"/>
-            </a:xfrm>
-          </p:grpSpPr>
-          <p:sp>
-            <p:nvSpPr>
-              <p:cNvPr id="62" name="Abgerundetes Rechteck 61"/>
-              <p:cNvSpPr/>
-              <p:nvPr/>
-            </p:nvSpPr>
-            <p:spPr>
-              <a:xfrm>
-                <a:off x="5039801" y="4348551"/>
-                <a:ext cx="1341120" cy="1673129"/>
-              </a:xfrm>
-              <a:prstGeom prst="roundRect">
-                <a:avLst/>
-              </a:prstGeom>
-              <a:solidFill>
-                <a:schemeClr val="bg1"/>
-              </a:solidFill>
-              <a:ln w="79375">
-                <a:solidFill>
-                  <a:schemeClr val="tx1"/>
-                </a:solidFill>
-              </a:ln>
-            </p:spPr>
-            <p:style>
-              <a:lnRef idx="2">
-                <a:schemeClr val="accent1">
-                  <a:shade val="50000"/>
-                </a:schemeClr>
-              </a:lnRef>
-              <a:fillRef idx="1">
-                <a:schemeClr val="accent1"/>
-              </a:fillRef>
-              <a:effectRef idx="0">
-                <a:schemeClr val="accent1"/>
-              </a:effectRef>
-              <a:fontRef idx="minor">
-                <a:schemeClr val="lt1"/>
-              </a:fontRef>
-            </p:style>
-            <p:txBody>
-              <a:bodyPr rtlCol="0" anchor="ctr"/>
-              <a:lstStyle/>
-              <a:p>
-                <a:pPr algn="ctr"/>
-                <a:endParaRPr lang="de-DE"/>
-              </a:p>
-            </p:txBody>
-          </p:sp>
-          <p:sp>
-            <p:nvSpPr>
-              <p:cNvPr id="63" name="Flussdiagramm: Gespeicherte Daten 62"/>
-              <p:cNvSpPr/>
-              <p:nvPr/>
-            </p:nvSpPr>
-            <p:spPr>
-              <a:xfrm>
-                <a:off x="5654040" y="4294972"/>
-                <a:ext cx="274320" cy="104147"/>
-              </a:xfrm>
-              <a:prstGeom prst="flowChartOnlineStorage">
-                <a:avLst/>
-              </a:prstGeom>
-              <a:solidFill>
-                <a:schemeClr val="bg1"/>
-              </a:solidFill>
-              <a:ln>
-                <a:solidFill>
-                  <a:schemeClr val="bg1"/>
-                </a:solidFill>
-              </a:ln>
-            </p:spPr>
-            <p:style>
-              <a:lnRef idx="2">
-                <a:schemeClr val="accent1">
-                  <a:shade val="50000"/>
-                </a:schemeClr>
-              </a:lnRef>
-              <a:fillRef idx="1">
-                <a:schemeClr val="accent1"/>
-              </a:fillRef>
-              <a:effectRef idx="0">
-                <a:schemeClr val="accent1"/>
-              </a:effectRef>
-              <a:fontRef idx="minor">
-                <a:schemeClr val="lt1"/>
-              </a:fontRef>
-            </p:style>
-            <p:txBody>
-              <a:bodyPr rtlCol="0" anchor="ctr"/>
-              <a:lstStyle/>
-              <a:p>
-                <a:pPr algn="ctr"/>
-                <a:endParaRPr lang="de-DE"/>
-              </a:p>
-            </p:txBody>
-          </p:sp>
-          <p:sp>
-            <p:nvSpPr>
-              <p:cNvPr id="64" name="Flussdiagramm: Gespeicherte Daten 63"/>
-              <p:cNvSpPr/>
-              <p:nvPr/>
-            </p:nvSpPr>
-            <p:spPr>
-              <a:xfrm rot="10800000">
-                <a:off x="5476237" y="4294971"/>
-                <a:ext cx="274320" cy="104147"/>
-              </a:xfrm>
-              <a:prstGeom prst="flowChartOnlineStorage">
-                <a:avLst/>
-              </a:prstGeom>
-              <a:solidFill>
-                <a:schemeClr val="bg1"/>
-              </a:solidFill>
-              <a:ln>
-                <a:solidFill>
-                  <a:schemeClr val="bg1"/>
-                </a:solidFill>
-              </a:ln>
-            </p:spPr>
-            <p:style>
-              <a:lnRef idx="2">
-                <a:schemeClr val="accent1">
-                  <a:shade val="50000"/>
-                </a:schemeClr>
-              </a:lnRef>
-              <a:fillRef idx="1">
-                <a:schemeClr val="accent1"/>
-              </a:fillRef>
-              <a:effectRef idx="0">
-                <a:schemeClr val="accent1"/>
-              </a:effectRef>
-              <a:fontRef idx="minor">
-                <a:schemeClr val="lt1"/>
-              </a:fontRef>
-            </p:style>
-            <p:txBody>
-              <a:bodyPr rtlCol="0" anchor="ctr"/>
-              <a:lstStyle/>
-              <a:p>
-                <a:pPr algn="ctr"/>
-                <a:endParaRPr lang="de-DE"/>
-              </a:p>
-            </p:txBody>
-          </p:sp>
-        </p:grpSp>
-        <p:cxnSp>
-          <p:nvCxnSpPr>
-            <p:cNvPr id="55" name="Gerader Verbinder 54"/>
-            <p:cNvCxnSpPr/>
-            <p:nvPr/>
-          </p:nvCxnSpPr>
-          <p:spPr>
-            <a:xfrm flipV="1">
-              <a:off x="5064760" y="5661660"/>
-              <a:ext cx="1302373" cy="2540"/>
-            </a:xfrm>
-            <a:prstGeom prst="line">
-              <a:avLst/>
-            </a:prstGeom>
-            <a:ln w="79375">
-              <a:solidFill>
-                <a:schemeClr val="tx1"/>
-              </a:solidFill>
-            </a:ln>
-          </p:spPr>
-          <p:style>
-            <a:lnRef idx="1">
-              <a:schemeClr val="accent1"/>
-            </a:lnRef>
-            <a:fillRef idx="0">
-              <a:schemeClr val="accent1"/>
-            </a:fillRef>
-            <a:effectRef idx="0">
-              <a:schemeClr val="accent1"/>
-            </a:effectRef>
-            <a:fontRef idx="minor">
-              <a:schemeClr val="tx1"/>
-            </a:fontRef>
-          </p:style>
-        </p:cxnSp>
-        <p:sp>
-          <p:nvSpPr>
-            <p:cNvPr id="56" name="Abgerundetes Rechteck 55"/>
-            <p:cNvSpPr/>
-            <p:nvPr/>
-          </p:nvSpPr>
-          <p:spPr>
-            <a:xfrm>
-              <a:off x="5717540" y="5805731"/>
-              <a:ext cx="518160" cy="66749"/>
-            </a:xfrm>
-            <a:prstGeom prst="roundRect">
-              <a:avLst>
-                <a:gd name="adj" fmla="val 50000"/>
-              </a:avLst>
-            </a:prstGeom>
-            <a:solidFill>
-              <a:schemeClr val="tx1"/>
-            </a:solidFill>
-            <a:ln>
-              <a:solidFill>
-                <a:schemeClr val="tx1"/>
-              </a:solidFill>
-            </a:ln>
-          </p:spPr>
-          <p:style>
-            <a:lnRef idx="2">
-              <a:schemeClr val="accent1">
-                <a:shade val="50000"/>
-              </a:schemeClr>
-            </a:lnRef>
-            <a:fillRef idx="1">
-              <a:schemeClr val="accent1"/>
-            </a:fillRef>
-            <a:effectRef idx="0">
-              <a:schemeClr val="accent1"/>
-            </a:effectRef>
-            <a:fontRef idx="minor">
-              <a:schemeClr val="lt1"/>
-            </a:fontRef>
-          </p:style>
-          <p:txBody>
-            <a:bodyPr rtlCol="0" anchor="ctr"/>
-            <a:lstStyle/>
-            <a:p>
-              <a:pPr algn="ctr"/>
-              <a:endParaRPr lang="de-DE" dirty="0"/>
-            </a:p>
-          </p:txBody>
-        </p:sp>
-        <p:sp>
-          <p:nvSpPr>
-            <p:cNvPr id="57" name="Abgerundetes Rechteck 56"/>
-            <p:cNvSpPr/>
-            <p:nvPr/>
-          </p:nvSpPr>
-          <p:spPr>
-            <a:xfrm>
-              <a:off x="5303742" y="5805730"/>
-              <a:ext cx="305562" cy="66749"/>
-            </a:xfrm>
-            <a:prstGeom prst="roundRect">
-              <a:avLst>
-                <a:gd name="adj" fmla="val 50000"/>
-              </a:avLst>
-            </a:prstGeom>
-            <a:solidFill>
-              <a:schemeClr val="tx1"/>
-            </a:solidFill>
-            <a:ln>
-              <a:solidFill>
-                <a:schemeClr val="tx1"/>
-              </a:solidFill>
-            </a:ln>
-          </p:spPr>
-          <p:style>
-            <a:lnRef idx="2">
-              <a:schemeClr val="accent1">
-                <a:shade val="50000"/>
-              </a:schemeClr>
-            </a:lnRef>
-            <a:fillRef idx="1">
-              <a:schemeClr val="accent1"/>
-            </a:fillRef>
-            <a:effectRef idx="0">
-              <a:schemeClr val="accent1"/>
-            </a:effectRef>
-            <a:fontRef idx="minor">
-              <a:schemeClr val="lt1"/>
-            </a:fontRef>
-          </p:style>
-          <p:txBody>
-            <a:bodyPr rtlCol="0" anchor="ctr"/>
-            <a:lstStyle/>
-            <a:p>
-              <a:pPr algn="ctr"/>
-              <a:endParaRPr lang="de-DE" dirty="0"/>
-            </a:p>
-          </p:txBody>
-        </p:sp>
-        <p:sp>
-          <p:nvSpPr>
-            <p:cNvPr id="58" name="Trapezoid 57"/>
-            <p:cNvSpPr/>
-            <p:nvPr/>
-          </p:nvSpPr>
-          <p:spPr>
-            <a:xfrm rot="10800000">
-              <a:off x="5544060" y="4080592"/>
-              <a:ext cx="328998" cy="385618"/>
-            </a:xfrm>
-            <a:prstGeom prst="trapezoid">
-              <a:avLst/>
-            </a:prstGeom>
-            <a:solidFill>
-              <a:schemeClr val="bg1"/>
-            </a:solidFill>
-            <a:ln w="57150">
-              <a:solidFill>
-                <a:schemeClr val="tx1"/>
-              </a:solidFill>
-            </a:ln>
-          </p:spPr>
-          <p:style>
-            <a:lnRef idx="2">
-              <a:schemeClr val="accent1">
-                <a:shade val="50000"/>
-              </a:schemeClr>
-            </a:lnRef>
-            <a:fillRef idx="1">
-              <a:schemeClr val="accent1"/>
-            </a:fillRef>
-            <a:effectRef idx="0">
-              <a:schemeClr val="accent1"/>
-            </a:effectRef>
-            <a:fontRef idx="minor">
-              <a:schemeClr val="lt1"/>
-            </a:fontRef>
-          </p:style>
-          <p:txBody>
-            <a:bodyPr rtlCol="0" anchor="ctr"/>
-            <a:lstStyle/>
-            <a:p>
-              <a:pPr algn="ctr"/>
-              <a:endParaRPr lang="de-DE"/>
-            </a:p>
-          </p:txBody>
-        </p:sp>
-        <p:grpSp>
-          <p:nvGrpSpPr>
-            <p:cNvPr id="59" name="Gruppieren 58"/>
-            <p:cNvGrpSpPr/>
-            <p:nvPr/>
-          </p:nvGrpSpPr>
-          <p:grpSpPr>
-            <a:xfrm>
-              <a:off x="5351995" y="4586113"/>
-              <a:ext cx="713511" cy="1573134"/>
-              <a:chOff x="807176" y="2862715"/>
-              <a:chExt cx="864657" cy="1866325"/>
-            </a:xfrm>
-          </p:grpSpPr>
-          <p:sp>
-            <p:nvSpPr>
-              <p:cNvPr id="60" name="Ellipse 59"/>
-              <p:cNvSpPr/>
-              <p:nvPr/>
-            </p:nvSpPr>
-            <p:spPr>
-              <a:xfrm>
-                <a:off x="993299" y="2862715"/>
-                <a:ext cx="480306" cy="451172"/>
-              </a:xfrm>
-              <a:prstGeom prst="ellipse">
-                <a:avLst/>
-              </a:prstGeom>
-              <a:noFill/>
-              <a:ln w="34925">
-                <a:solidFill>
-                  <a:schemeClr val="tx1"/>
-                </a:solidFill>
-              </a:ln>
-            </p:spPr>
-            <p:style>
-              <a:lnRef idx="2">
-                <a:schemeClr val="accent3">
-                  <a:shade val="50000"/>
-                </a:schemeClr>
-              </a:lnRef>
-              <a:fillRef idx="1">
-                <a:schemeClr val="accent3"/>
-              </a:fillRef>
-              <a:effectRef idx="0">
-                <a:schemeClr val="accent3"/>
-              </a:effectRef>
-              <a:fontRef idx="minor">
-                <a:schemeClr val="lt1"/>
-              </a:fontRef>
-            </p:style>
-            <p:txBody>
-              <a:bodyPr rtlCol="0" anchor="ctr"/>
-              <a:lstStyle/>
-              <a:p>
-                <a:pPr algn="ctr"/>
-                <a:endParaRPr lang="de-DE"/>
-              </a:p>
-            </p:txBody>
-          </p:sp>
-          <p:sp>
-            <p:nvSpPr>
-              <p:cNvPr id="61" name="Sehne 60"/>
-              <p:cNvSpPr/>
-              <p:nvPr/>
-            </p:nvSpPr>
-            <p:spPr>
-              <a:xfrm rot="5400000">
-                <a:off x="547966" y="3605173"/>
-                <a:ext cx="1383077" cy="864657"/>
-              </a:xfrm>
-              <a:prstGeom prst="chord">
-                <a:avLst>
-                  <a:gd name="adj1" fmla="val 6350610"/>
-                  <a:gd name="adj2" fmla="val 15311491"/>
-                </a:avLst>
-              </a:prstGeom>
-              <a:noFill/>
-              <a:ln w="34925">
-                <a:solidFill>
-                  <a:schemeClr val="tx1"/>
-                </a:solidFill>
-              </a:ln>
-            </p:spPr>
-            <p:style>
-              <a:lnRef idx="2">
-                <a:schemeClr val="accent1">
-                  <a:shade val="50000"/>
-                </a:schemeClr>
-              </a:lnRef>
-              <a:fillRef idx="1">
-                <a:schemeClr val="accent1"/>
-              </a:fillRef>
-              <a:effectRef idx="0">
-                <a:schemeClr val="accent1"/>
-              </a:effectRef>
-              <a:fontRef idx="minor">
-                <a:schemeClr val="lt1"/>
-              </a:fontRef>
-            </p:style>
-            <p:txBody>
-              <a:bodyPr rtlCol="0" anchor="ctr"/>
-              <a:lstStyle/>
-              <a:p>
-                <a:pPr algn="ctr"/>
-                <a:endParaRPr lang="de-DE" dirty="0"/>
-              </a:p>
-            </p:txBody>
-          </p:sp>
-        </p:grpSp>
-      </p:grpSp>
-    </p:spTree>
-    <p:extLst>
-      <p:ext uri="{BB962C8B-B14F-4D97-AF65-F5344CB8AC3E}">
-        <p14:creationId xmlns:p14="http://schemas.microsoft.com/office/powerpoint/2010/main" val="2046820762"/>
-      </p:ext>
-    </p:extLst>
-  </p:cSld>
-  <p:clrMapOvr>
-    <a:masterClrMapping/>
-  </p:clrMapOvr>
-  <p:transition spd="slow">
-    <p:fade/>
-  </p:transition>
-  <p:timing>
-    <p:tnLst>
-      <p:par>
-        <p:cTn id="1" dur="indefinite" restart="never" nodeType="tmRoot"/>
-      </p:par>
-    </p:tnLst>
-  </p:timing>
-</p:sld>
-</file>
-
-<file path=ppt/slides/slide16.xml><?xml version="1.0" encoding="utf-8"?>
 <p:sld xmlns:a="http://schemas.openxmlformats.org/drawingml/2006/main" xmlns:r="http://schemas.openxmlformats.org/officeDocument/2006/relationships" xmlns:p="http://schemas.openxmlformats.org/presentationml/2006/main">
   <p:cSld>
     <p:spTree>
@@ -15377,7 +13721,7 @@
 </p:sld>
 </file>
 
-<file path=ppt/slides/slide17.xml><?xml version="1.0" encoding="utf-8"?>
+<file path=ppt/slides/slide16.xml><?xml version="1.0" encoding="utf-8"?>
 <p:sld xmlns:a="http://schemas.openxmlformats.org/drawingml/2006/main" xmlns:r="http://schemas.openxmlformats.org/officeDocument/2006/relationships" xmlns:p="http://schemas.openxmlformats.org/presentationml/2006/main">
   <p:cSld>
     <p:spTree>
@@ -15627,7 +13971,7 @@
 </p:sld>
 </file>
 
-<file path=ppt/slides/slide18.xml><?xml version="1.0" encoding="utf-8"?>
+<file path=ppt/slides/slide17.xml><?xml version="1.0" encoding="utf-8"?>
 <p:sld xmlns:a="http://schemas.openxmlformats.org/drawingml/2006/main" xmlns:r="http://schemas.openxmlformats.org/officeDocument/2006/relationships" xmlns:p="http://schemas.openxmlformats.org/presentationml/2006/main">
   <p:cSld>
     <p:spTree>

</xml_diff>